<commit_message>
Add SD for tagcolor and fix some problems with SD for appointment
</commit_message>
<xml_diff>
--- a/docs/diagrams/AppointmentSequenceDiagram.pptx
+++ b/docs/diagrams/AppointmentSequenceDiagram.pptx
@@ -265,7 +265,7 @@
           <a:p>
             <a:fld id="{125D2542-4891-4C31-98CC-513778ECB934}" type="datetimeFigureOut">
               <a:rPr lang="en-SG" smtClean="0"/>
-              <a:t>29/10/2017</a:t>
+              <a:t>30/10/2017</a:t>
             </a:fld>
             <a:endParaRPr lang="en-SG"/>
           </a:p>
@@ -465,7 +465,7 @@
           <a:p>
             <a:fld id="{125D2542-4891-4C31-98CC-513778ECB934}" type="datetimeFigureOut">
               <a:rPr lang="en-SG" smtClean="0"/>
-              <a:t>29/10/2017</a:t>
+              <a:t>30/10/2017</a:t>
             </a:fld>
             <a:endParaRPr lang="en-SG"/>
           </a:p>
@@ -675,7 +675,7 @@
           <a:p>
             <a:fld id="{125D2542-4891-4C31-98CC-513778ECB934}" type="datetimeFigureOut">
               <a:rPr lang="en-SG" smtClean="0"/>
-              <a:t>29/10/2017</a:t>
+              <a:t>30/10/2017</a:t>
             </a:fld>
             <a:endParaRPr lang="en-SG"/>
           </a:p>
@@ -875,7 +875,7 @@
           <a:p>
             <a:fld id="{125D2542-4891-4C31-98CC-513778ECB934}" type="datetimeFigureOut">
               <a:rPr lang="en-SG" smtClean="0"/>
-              <a:t>29/10/2017</a:t>
+              <a:t>30/10/2017</a:t>
             </a:fld>
             <a:endParaRPr lang="en-SG"/>
           </a:p>
@@ -1151,7 +1151,7 @@
           <a:p>
             <a:fld id="{125D2542-4891-4C31-98CC-513778ECB934}" type="datetimeFigureOut">
               <a:rPr lang="en-SG" smtClean="0"/>
-              <a:t>29/10/2017</a:t>
+              <a:t>30/10/2017</a:t>
             </a:fld>
             <a:endParaRPr lang="en-SG"/>
           </a:p>
@@ -1419,7 +1419,7 @@
           <a:p>
             <a:fld id="{125D2542-4891-4C31-98CC-513778ECB934}" type="datetimeFigureOut">
               <a:rPr lang="en-SG" smtClean="0"/>
-              <a:t>29/10/2017</a:t>
+              <a:t>30/10/2017</a:t>
             </a:fld>
             <a:endParaRPr lang="en-SG"/>
           </a:p>
@@ -1834,7 +1834,7 @@
           <a:p>
             <a:fld id="{125D2542-4891-4C31-98CC-513778ECB934}" type="datetimeFigureOut">
               <a:rPr lang="en-SG" smtClean="0"/>
-              <a:t>29/10/2017</a:t>
+              <a:t>30/10/2017</a:t>
             </a:fld>
             <a:endParaRPr lang="en-SG"/>
           </a:p>
@@ -1976,7 +1976,7 @@
           <a:p>
             <a:fld id="{125D2542-4891-4C31-98CC-513778ECB934}" type="datetimeFigureOut">
               <a:rPr lang="en-SG" smtClean="0"/>
-              <a:t>29/10/2017</a:t>
+              <a:t>30/10/2017</a:t>
             </a:fld>
             <a:endParaRPr lang="en-SG"/>
           </a:p>
@@ -2089,7 +2089,7 @@
           <a:p>
             <a:fld id="{125D2542-4891-4C31-98CC-513778ECB934}" type="datetimeFigureOut">
               <a:rPr lang="en-SG" smtClean="0"/>
-              <a:t>29/10/2017</a:t>
+              <a:t>30/10/2017</a:t>
             </a:fld>
             <a:endParaRPr lang="en-SG"/>
           </a:p>
@@ -2402,7 +2402,7 @@
           <a:p>
             <a:fld id="{125D2542-4891-4C31-98CC-513778ECB934}" type="datetimeFigureOut">
               <a:rPr lang="en-SG" smtClean="0"/>
-              <a:t>29/10/2017</a:t>
+              <a:t>30/10/2017</a:t>
             </a:fld>
             <a:endParaRPr lang="en-SG"/>
           </a:p>
@@ -2691,7 +2691,7 @@
           <a:p>
             <a:fld id="{125D2542-4891-4C31-98CC-513778ECB934}" type="datetimeFigureOut">
               <a:rPr lang="en-SG" smtClean="0"/>
-              <a:t>29/10/2017</a:t>
+              <a:t>30/10/2017</a:t>
             </a:fld>
             <a:endParaRPr lang="en-SG"/>
           </a:p>
@@ -2934,7 +2934,7 @@
           <a:p>
             <a:fld id="{125D2542-4891-4C31-98CC-513778ECB934}" type="datetimeFigureOut">
               <a:rPr lang="en-SG" smtClean="0"/>
-              <a:t>29/10/2017</a:t>
+              <a:t>30/10/2017</a:t>
             </a:fld>
             <a:endParaRPr lang="en-SG"/>
           </a:p>
@@ -3683,7 +3683,7 @@
         <p:spPr>
           <a:xfrm>
             <a:off x="2049942" y="1078249"/>
-            <a:ext cx="0" cy="3481399"/>
+            <a:ext cx="5203" cy="5502349"/>
           </a:xfrm>
           <a:prstGeom prst="line">
             <a:avLst/>
@@ -3725,8 +3725,8 @@
         </p:nvSpPr>
         <p:spPr>
           <a:xfrm>
-            <a:off x="1977934" y="1428943"/>
-            <a:ext cx="152400" cy="2932689"/>
+            <a:off x="1977933" y="1428943"/>
+            <a:ext cx="159243" cy="4946172"/>
           </a:xfrm>
           <a:prstGeom prst="rect">
             <a:avLst/>
@@ -4169,7 +4169,7 @@
         <p:spPr>
           <a:xfrm>
             <a:off x="3809856" y="1856319"/>
-            <a:ext cx="0" cy="1482984"/>
+            <a:ext cx="0" cy="4380094"/>
           </a:xfrm>
           <a:prstGeom prst="line">
             <a:avLst/>
@@ -4211,8 +4211,8 @@
         </p:nvSpPr>
         <p:spPr>
           <a:xfrm>
-            <a:off x="3732653" y="2176369"/>
-            <a:ext cx="154408" cy="767790"/>
+            <a:off x="3732652" y="2176368"/>
+            <a:ext cx="166703" cy="3597707"/>
           </a:xfrm>
           <a:prstGeom prst="rect">
             <a:avLst/>
@@ -5344,7 +5344,7 @@
         <p:spPr>
           <a:xfrm>
             <a:off x="9605859" y="940844"/>
-            <a:ext cx="46513" cy="5301991"/>
+            <a:ext cx="0" cy="5783592"/>
           </a:xfrm>
           <a:prstGeom prst="line">
             <a:avLst/>
@@ -5386,8 +5386,8 @@
         </p:nvSpPr>
         <p:spPr>
           <a:xfrm>
-            <a:off x="9522308" y="1262964"/>
-            <a:ext cx="192482" cy="4500900"/>
+            <a:off x="9522308" y="1262963"/>
+            <a:ext cx="192482" cy="4819337"/>
           </a:xfrm>
           <a:prstGeom prst="rect">
             <a:avLst/>
@@ -5523,47 +5523,6 @@
           </a:p>
         </p:txBody>
       </p:sp>
-      <p:cxnSp>
-        <p:nvCxnSpPr>
-          <p:cNvPr id="141" name="Straight Arrow Connector 140">
-            <a:extLst>
-              <a:ext uri="{FF2B5EF4-FFF2-40B4-BE49-F238E27FC236}">
-                <a16:creationId xmlns:a16="http://schemas.microsoft.com/office/drawing/2014/main" id="{D7A59AB4-F261-4D5B-9935-299A792E6845}"/>
-              </a:ext>
-            </a:extLst>
-          </p:cNvPr>
-          <p:cNvCxnSpPr>
-            <a:cxnSpLocks/>
-          </p:cNvCxnSpPr>
-          <p:nvPr/>
-        </p:nvCxnSpPr>
-        <p:spPr>
-          <a:xfrm>
-            <a:off x="5489379" y="5061858"/>
-            <a:ext cx="4052144" cy="0"/>
-          </a:xfrm>
-          <a:prstGeom prst="straightConnector1">
-            <a:avLst/>
-          </a:prstGeom>
-          <a:ln>
-            <a:tailEnd type="triangle"/>
-          </a:ln>
-        </p:spPr>
-        <p:style>
-          <a:lnRef idx="3">
-            <a:schemeClr val="dk1"/>
-          </a:lnRef>
-          <a:fillRef idx="0">
-            <a:schemeClr val="dk1"/>
-          </a:fillRef>
-          <a:effectRef idx="2">
-            <a:schemeClr val="dk1"/>
-          </a:effectRef>
-          <a:fontRef idx="minor">
-            <a:schemeClr val="tx1"/>
-          </a:fontRef>
-        </p:style>
-      </p:cxnSp>
       <p:sp>
         <p:nvSpPr>
           <p:cNvPr id="145" name="Rectangle: Single Corner Snipped 144">
@@ -5740,6 +5699,176 @@
           </a:p>
         </p:txBody>
       </p:sp>
+      <p:cxnSp>
+        <p:nvCxnSpPr>
+          <p:cNvPr id="39" name="Straight Arrow Connector 38">
+            <a:extLst>
+              <a:ext uri="{FF2B5EF4-FFF2-40B4-BE49-F238E27FC236}">
+                <a16:creationId xmlns:a16="http://schemas.microsoft.com/office/drawing/2014/main" id="{9EC5A4F2-10D5-4112-93D3-9F8A629D4ECD}"/>
+              </a:ext>
+            </a:extLst>
+          </p:cNvPr>
+          <p:cNvCxnSpPr>
+            <a:cxnSpLocks/>
+          </p:cNvCxnSpPr>
+          <p:nvPr/>
+        </p:nvCxnSpPr>
+        <p:spPr>
+          <a:xfrm flipH="1">
+            <a:off x="2201513" y="5774075"/>
+            <a:ext cx="1329240" cy="0"/>
+          </a:xfrm>
+          <a:prstGeom prst="straightConnector1">
+            <a:avLst/>
+          </a:prstGeom>
+          <a:ln w="19050">
+            <a:prstDash val="sysDash"/>
+            <a:tailEnd type="triangle"/>
+          </a:ln>
+        </p:spPr>
+        <p:style>
+          <a:lnRef idx="1">
+            <a:schemeClr val="accent1"/>
+          </a:lnRef>
+          <a:fillRef idx="0">
+            <a:schemeClr val="accent1"/>
+          </a:fillRef>
+          <a:effectRef idx="0">
+            <a:schemeClr val="accent1"/>
+          </a:effectRef>
+          <a:fontRef idx="minor">
+            <a:schemeClr val="tx1"/>
+          </a:fontRef>
+        </p:style>
+      </p:cxnSp>
+      <p:cxnSp>
+        <p:nvCxnSpPr>
+          <p:cNvPr id="40" name="Straight Arrow Connector 39">
+            <a:extLst>
+              <a:ext uri="{FF2B5EF4-FFF2-40B4-BE49-F238E27FC236}">
+                <a16:creationId xmlns:a16="http://schemas.microsoft.com/office/drawing/2014/main" id="{F9840FF0-126B-4DD0-9B1C-87222C4DA902}"/>
+              </a:ext>
+            </a:extLst>
+          </p:cNvPr>
+          <p:cNvCxnSpPr>
+            <a:cxnSpLocks/>
+          </p:cNvCxnSpPr>
+          <p:nvPr/>
+        </p:nvCxnSpPr>
+        <p:spPr>
+          <a:xfrm flipH="1">
+            <a:off x="3952007" y="5495967"/>
+            <a:ext cx="1329240" cy="0"/>
+          </a:xfrm>
+          <a:prstGeom prst="straightConnector1">
+            <a:avLst/>
+          </a:prstGeom>
+          <a:ln w="19050">
+            <a:prstDash val="sysDash"/>
+            <a:tailEnd type="triangle"/>
+          </a:ln>
+        </p:spPr>
+        <p:style>
+          <a:lnRef idx="1">
+            <a:schemeClr val="accent1"/>
+          </a:lnRef>
+          <a:fillRef idx="0">
+            <a:schemeClr val="accent1"/>
+          </a:fillRef>
+          <a:effectRef idx="0">
+            <a:schemeClr val="accent1"/>
+          </a:effectRef>
+          <a:fontRef idx="minor">
+            <a:schemeClr val="tx1"/>
+          </a:fontRef>
+        </p:style>
+      </p:cxnSp>
+      <p:cxnSp>
+        <p:nvCxnSpPr>
+          <p:cNvPr id="45" name="Straight Arrow Connector 44">
+            <a:extLst>
+              <a:ext uri="{FF2B5EF4-FFF2-40B4-BE49-F238E27FC236}">
+                <a16:creationId xmlns:a16="http://schemas.microsoft.com/office/drawing/2014/main" id="{41CF7E6C-EF55-475F-8954-586D9B8B8C39}"/>
+              </a:ext>
+            </a:extLst>
+          </p:cNvPr>
+          <p:cNvCxnSpPr>
+            <a:cxnSpLocks/>
+          </p:cNvCxnSpPr>
+          <p:nvPr/>
+        </p:nvCxnSpPr>
+        <p:spPr>
+          <a:xfrm flipH="1">
+            <a:off x="623598" y="6236413"/>
+            <a:ext cx="1329240" cy="0"/>
+          </a:xfrm>
+          <a:prstGeom prst="straightConnector1">
+            <a:avLst/>
+          </a:prstGeom>
+          <a:ln w="19050">
+            <a:prstDash val="sysDash"/>
+            <a:tailEnd type="triangle"/>
+          </a:ln>
+        </p:spPr>
+        <p:style>
+          <a:lnRef idx="1">
+            <a:schemeClr val="accent1"/>
+          </a:lnRef>
+          <a:fillRef idx="0">
+            <a:schemeClr val="accent1"/>
+          </a:fillRef>
+          <a:effectRef idx="0">
+            <a:schemeClr val="accent1"/>
+          </a:effectRef>
+          <a:fontRef idx="minor">
+            <a:schemeClr val="tx1"/>
+          </a:fontRef>
+        </p:style>
+      </p:cxnSp>
+      <p:cxnSp>
+        <p:nvCxnSpPr>
+          <p:cNvPr id="47" name="Straight Arrow Connector 46">
+            <a:extLst>
+              <a:ext uri="{FF2B5EF4-FFF2-40B4-BE49-F238E27FC236}">
+                <a16:creationId xmlns:a16="http://schemas.microsoft.com/office/drawing/2014/main" id="{F7E7A304-7D89-472F-B7C6-B88448DE8B20}"/>
+              </a:ext>
+            </a:extLst>
+          </p:cNvPr>
+          <p:cNvCxnSpPr>
+            <a:cxnSpLocks/>
+          </p:cNvCxnSpPr>
+          <p:nvPr/>
+        </p:nvCxnSpPr>
+        <p:spPr>
+          <a:xfrm flipH="1">
+            <a:off x="5613628" y="5255467"/>
+            <a:ext cx="3635534" cy="0"/>
+          </a:xfrm>
+          <a:prstGeom prst="straightConnector1">
+            <a:avLst/>
+          </a:prstGeom>
+          <a:ln w="19050">
+            <a:solidFill>
+              <a:schemeClr val="tx1"/>
+            </a:solidFill>
+            <a:tailEnd type="arrow"/>
+          </a:ln>
+        </p:spPr>
+        <p:style>
+          <a:lnRef idx="1">
+            <a:schemeClr val="accent1"/>
+          </a:lnRef>
+          <a:fillRef idx="0">
+            <a:schemeClr val="accent1"/>
+          </a:fillRef>
+          <a:effectRef idx="0">
+            <a:schemeClr val="accent1"/>
+          </a:effectRef>
+          <a:fontRef idx="minor">
+            <a:schemeClr val="tx1"/>
+          </a:fontRef>
+        </p:style>
+      </p:cxnSp>
     </p:spTree>
     <p:extLst>
       <p:ext uri="{BB962C8B-B14F-4D97-AF65-F5344CB8AC3E}">

</xml_diff>

<commit_message>
Update DG for appointments
</commit_message>
<xml_diff>
--- a/docs/diagrams/AppointmentSequenceDiagram.pptx
+++ b/docs/diagrams/AppointmentSequenceDiagram.pptx
@@ -265,7 +265,7 @@
           <a:p>
             <a:fld id="{125D2542-4891-4C31-98CC-513778ECB934}" type="datetimeFigureOut">
               <a:rPr lang="en-SG" smtClean="0"/>
-              <a:t>30/10/2017</a:t>
+              <a:t>8/11/2017</a:t>
             </a:fld>
             <a:endParaRPr lang="en-SG"/>
           </a:p>
@@ -465,7 +465,7 @@
           <a:p>
             <a:fld id="{125D2542-4891-4C31-98CC-513778ECB934}" type="datetimeFigureOut">
               <a:rPr lang="en-SG" smtClean="0"/>
-              <a:t>30/10/2017</a:t>
+              <a:t>8/11/2017</a:t>
             </a:fld>
             <a:endParaRPr lang="en-SG"/>
           </a:p>
@@ -675,7 +675,7 @@
           <a:p>
             <a:fld id="{125D2542-4891-4C31-98CC-513778ECB934}" type="datetimeFigureOut">
               <a:rPr lang="en-SG" smtClean="0"/>
-              <a:t>30/10/2017</a:t>
+              <a:t>8/11/2017</a:t>
             </a:fld>
             <a:endParaRPr lang="en-SG"/>
           </a:p>
@@ -875,7 +875,7 @@
           <a:p>
             <a:fld id="{125D2542-4891-4C31-98CC-513778ECB934}" type="datetimeFigureOut">
               <a:rPr lang="en-SG" smtClean="0"/>
-              <a:t>30/10/2017</a:t>
+              <a:t>8/11/2017</a:t>
             </a:fld>
             <a:endParaRPr lang="en-SG"/>
           </a:p>
@@ -1151,7 +1151,7 @@
           <a:p>
             <a:fld id="{125D2542-4891-4C31-98CC-513778ECB934}" type="datetimeFigureOut">
               <a:rPr lang="en-SG" smtClean="0"/>
-              <a:t>30/10/2017</a:t>
+              <a:t>8/11/2017</a:t>
             </a:fld>
             <a:endParaRPr lang="en-SG"/>
           </a:p>
@@ -1419,7 +1419,7 @@
           <a:p>
             <a:fld id="{125D2542-4891-4C31-98CC-513778ECB934}" type="datetimeFigureOut">
               <a:rPr lang="en-SG" smtClean="0"/>
-              <a:t>30/10/2017</a:t>
+              <a:t>8/11/2017</a:t>
             </a:fld>
             <a:endParaRPr lang="en-SG"/>
           </a:p>
@@ -1834,7 +1834,7 @@
           <a:p>
             <a:fld id="{125D2542-4891-4C31-98CC-513778ECB934}" type="datetimeFigureOut">
               <a:rPr lang="en-SG" smtClean="0"/>
-              <a:t>30/10/2017</a:t>
+              <a:t>8/11/2017</a:t>
             </a:fld>
             <a:endParaRPr lang="en-SG"/>
           </a:p>
@@ -1976,7 +1976,7 @@
           <a:p>
             <a:fld id="{125D2542-4891-4C31-98CC-513778ECB934}" type="datetimeFigureOut">
               <a:rPr lang="en-SG" smtClean="0"/>
-              <a:t>30/10/2017</a:t>
+              <a:t>8/11/2017</a:t>
             </a:fld>
             <a:endParaRPr lang="en-SG"/>
           </a:p>
@@ -2089,7 +2089,7 @@
           <a:p>
             <a:fld id="{125D2542-4891-4C31-98CC-513778ECB934}" type="datetimeFigureOut">
               <a:rPr lang="en-SG" smtClean="0"/>
-              <a:t>30/10/2017</a:t>
+              <a:t>8/11/2017</a:t>
             </a:fld>
             <a:endParaRPr lang="en-SG"/>
           </a:p>
@@ -2402,7 +2402,7 @@
           <a:p>
             <a:fld id="{125D2542-4891-4C31-98CC-513778ECB934}" type="datetimeFigureOut">
               <a:rPr lang="en-SG" smtClean="0"/>
-              <a:t>30/10/2017</a:t>
+              <a:t>8/11/2017</a:t>
             </a:fld>
             <a:endParaRPr lang="en-SG"/>
           </a:p>
@@ -2691,7 +2691,7 @@
           <a:p>
             <a:fld id="{125D2542-4891-4C31-98CC-513778ECB934}" type="datetimeFigureOut">
               <a:rPr lang="en-SG" smtClean="0"/>
-              <a:t>30/10/2017</a:t>
+              <a:t>8/11/2017</a:t>
             </a:fld>
             <a:endParaRPr lang="en-SG"/>
           </a:p>
@@ -2934,7 +2934,7 @@
           <a:p>
             <a:fld id="{125D2542-4891-4C31-98CC-513778ECB934}" type="datetimeFigureOut">
               <a:rPr lang="en-SG" smtClean="0"/>
-              <a:t>30/10/2017</a:t>
+              <a:t>8/11/2017</a:t>
             </a:fld>
             <a:endParaRPr lang="en-SG"/>
           </a:p>
@@ -3353,10 +3353,10 @@
       </p:grpSpPr>
       <p:sp>
         <p:nvSpPr>
-          <p:cNvPr id="144" name="Rectangle: Rounded Corners 143">
-            <a:extLst>
-              <a:ext uri="{FF2B5EF4-FFF2-40B4-BE49-F238E27FC236}">
-                <a16:creationId xmlns:a16="http://schemas.microsoft.com/office/drawing/2014/main" id="{9F10FAF8-CA2C-4A0F-813F-A4ADCAEBA4C8}"/>
+          <p:cNvPr id="160" name="Rectangle 159">
+            <a:extLst>
+              <a:ext uri="{FF2B5EF4-FFF2-40B4-BE49-F238E27FC236}">
+                <a16:creationId xmlns:a16="http://schemas.microsoft.com/office/drawing/2014/main" id="{21071E69-0CDF-4924-8621-E5D506DF0110}"/>
               </a:ext>
             </a:extLst>
           </p:cNvPr>
@@ -3365,374 +3365,14 @@
         </p:nvSpPr>
         <p:spPr>
           <a:xfrm>
-            <a:off x="8369410" y="3183902"/>
-            <a:ext cx="2908194" cy="2503412"/>
-          </a:xfrm>
-          <a:prstGeom prst="roundRect">
-            <a:avLst/>
-          </a:prstGeom>
-          <a:noFill/>
-          <a:ln/>
-        </p:spPr>
-        <p:style>
-          <a:lnRef idx="2">
-            <a:schemeClr val="accent1"/>
-          </a:lnRef>
-          <a:fillRef idx="1">
-            <a:schemeClr val="lt1"/>
-          </a:fillRef>
-          <a:effectRef idx="0">
-            <a:schemeClr val="accent1"/>
-          </a:effectRef>
-          <a:fontRef idx="minor">
-            <a:schemeClr val="dk1"/>
-          </a:fontRef>
-        </p:style>
-        <p:txBody>
-          <a:bodyPr rtlCol="0" anchor="ctr"/>
-          <a:lstStyle/>
-          <a:p>
-            <a:endParaRPr lang="en-SG" dirty="0"/>
-          </a:p>
-        </p:txBody>
-      </p:sp>
-      <p:sp>
-        <p:nvSpPr>
-          <p:cNvPr id="94" name="Rectangle: Rounded Corners 93">
-            <a:extLst>
-              <a:ext uri="{FF2B5EF4-FFF2-40B4-BE49-F238E27FC236}">
-                <a16:creationId xmlns:a16="http://schemas.microsoft.com/office/drawing/2014/main" id="{07B416CC-2747-41A7-B64D-19C4ED3DDE93}"/>
-              </a:ext>
-            </a:extLst>
-          </p:cNvPr>
-          <p:cNvSpPr/>
-          <p:nvPr/>
-        </p:nvSpPr>
-        <p:spPr>
-          <a:xfrm>
-            <a:off x="4159531" y="2452625"/>
-            <a:ext cx="2908194" cy="2503412"/>
-          </a:xfrm>
-          <a:prstGeom prst="roundRect">
-            <a:avLst/>
-          </a:prstGeom>
-          <a:solidFill>
-            <a:schemeClr val="bg1"/>
-          </a:solidFill>
-          <a:ln/>
-        </p:spPr>
-        <p:style>
-          <a:lnRef idx="2">
-            <a:schemeClr val="accent1"/>
-          </a:lnRef>
-          <a:fillRef idx="1">
-            <a:schemeClr val="lt1"/>
-          </a:fillRef>
-          <a:effectRef idx="0">
-            <a:schemeClr val="accent1"/>
-          </a:effectRef>
-          <a:fontRef idx="minor">
-            <a:schemeClr val="dk1"/>
-          </a:fontRef>
-        </p:style>
-        <p:txBody>
-          <a:bodyPr rtlCol="0" anchor="ctr"/>
-          <a:lstStyle/>
-          <a:p>
-            <a:pPr algn="ctr"/>
-            <a:endParaRPr lang="en-SG" dirty="0"/>
-          </a:p>
-        </p:txBody>
-      </p:sp>
-      <p:sp>
-        <p:nvSpPr>
-          <p:cNvPr id="128" name="Rectangle 127">
-            <a:extLst>
-              <a:ext uri="{FF2B5EF4-FFF2-40B4-BE49-F238E27FC236}">
-                <a16:creationId xmlns:a16="http://schemas.microsoft.com/office/drawing/2014/main" id="{95BC53AA-2F92-4DF8-B91F-BCA994B739D8}"/>
-              </a:ext>
-            </a:extLst>
-          </p:cNvPr>
-          <p:cNvSpPr/>
-          <p:nvPr/>
-        </p:nvSpPr>
-        <p:spPr>
-          <a:xfrm>
-            <a:off x="4345485" y="3213139"/>
-            <a:ext cx="2363289" cy="1405550"/>
+            <a:off x="7255327" y="4619017"/>
+            <a:ext cx="127904" cy="287759"/>
           </a:xfrm>
           <a:prstGeom prst="rect">
             <a:avLst/>
           </a:prstGeom>
           <a:solidFill>
-            <a:srgbClr val="FFC9E9"/>
-          </a:solidFill>
-          <a:ln>
-            <a:solidFill>
-              <a:srgbClr val="FF0000"/>
-            </a:solidFill>
-            <a:prstDash val="sysDash"/>
-          </a:ln>
-        </p:spPr>
-        <p:style>
-          <a:lnRef idx="2">
-            <a:schemeClr val="accent1">
-              <a:shade val="50000"/>
-            </a:schemeClr>
-          </a:lnRef>
-          <a:fillRef idx="1">
-            <a:schemeClr val="accent1"/>
-          </a:fillRef>
-          <a:effectRef idx="0">
-            <a:schemeClr val="accent1"/>
-          </a:effectRef>
-          <a:fontRef idx="minor">
-            <a:schemeClr val="lt1"/>
-          </a:fontRef>
-        </p:style>
-        <p:txBody>
-          <a:bodyPr rtlCol="0" anchor="ctr"/>
-          <a:lstStyle/>
-          <a:p>
-            <a:pPr algn="ctr"/>
-            <a:endParaRPr lang="en-SG"/>
-          </a:p>
-        </p:txBody>
-      </p:sp>
-      <p:sp>
-        <p:nvSpPr>
-          <p:cNvPr id="41" name="Rectangle 40">
-            <a:extLst>
-              <a:ext uri="{FF2B5EF4-FFF2-40B4-BE49-F238E27FC236}">
-                <a16:creationId xmlns:a16="http://schemas.microsoft.com/office/drawing/2014/main" id="{4363FA15-C064-44C4-9ABB-FB332217863B}"/>
-              </a:ext>
-            </a:extLst>
-          </p:cNvPr>
-          <p:cNvSpPr/>
-          <p:nvPr/>
-        </p:nvSpPr>
-        <p:spPr>
-          <a:xfrm>
-            <a:off x="1288218" y="588511"/>
-            <a:ext cx="2095900" cy="473802"/>
-          </a:xfrm>
-          <a:prstGeom prst="rect">
-            <a:avLst/>
-          </a:prstGeom>
-          <a:solidFill>
-            <a:srgbClr val="FF0000"/>
-          </a:solidFill>
-          <a:ln w="19050">
-            <a:solidFill>
-              <a:schemeClr val="tx1"/>
-            </a:solidFill>
-          </a:ln>
-          <a:effectLst/>
-        </p:spPr>
-        <p:style>
-          <a:lnRef idx="1">
-            <a:schemeClr val="accent2"/>
-          </a:lnRef>
-          <a:fillRef idx="2">
-            <a:schemeClr val="accent2"/>
-          </a:fillRef>
-          <a:effectRef idx="1">
-            <a:schemeClr val="accent2"/>
-          </a:effectRef>
-          <a:fontRef idx="minor">
-            <a:schemeClr val="dk1"/>
-          </a:fontRef>
-        </p:style>
-        <p:txBody>
-          <a:bodyPr rtlCol="0" anchor="ctr"/>
-          <a:lstStyle>
-            <a:defPPr>
-              <a:defRPr lang="en-US"/>
-            </a:defPPr>
-            <a:lvl1pPr marL="0" algn="l" defTabSz="914400" rtl="0" eaLnBrk="1" latinLnBrk="0" hangingPunct="1">
-              <a:defRPr sz="1800" kern="1200">
-                <a:solidFill>
-                  <a:schemeClr val="dk1"/>
-                </a:solidFill>
-                <a:latin typeface="+mn-lt"/>
-                <a:ea typeface="+mn-ea"/>
-                <a:cs typeface="+mn-cs"/>
-              </a:defRPr>
-            </a:lvl1pPr>
-            <a:lvl2pPr marL="457200" algn="l" defTabSz="914400" rtl="0" eaLnBrk="1" latinLnBrk="0" hangingPunct="1">
-              <a:defRPr sz="1800" kern="1200">
-                <a:solidFill>
-                  <a:schemeClr val="dk1"/>
-                </a:solidFill>
-                <a:latin typeface="+mn-lt"/>
-                <a:ea typeface="+mn-ea"/>
-                <a:cs typeface="+mn-cs"/>
-              </a:defRPr>
-            </a:lvl2pPr>
-            <a:lvl3pPr marL="914400" algn="l" defTabSz="914400" rtl="0" eaLnBrk="1" latinLnBrk="0" hangingPunct="1">
-              <a:defRPr sz="1800" kern="1200">
-                <a:solidFill>
-                  <a:schemeClr val="dk1"/>
-                </a:solidFill>
-                <a:latin typeface="+mn-lt"/>
-                <a:ea typeface="+mn-ea"/>
-                <a:cs typeface="+mn-cs"/>
-              </a:defRPr>
-            </a:lvl3pPr>
-            <a:lvl4pPr marL="1371600" algn="l" defTabSz="914400" rtl="0" eaLnBrk="1" latinLnBrk="0" hangingPunct="1">
-              <a:defRPr sz="1800" kern="1200">
-                <a:solidFill>
-                  <a:schemeClr val="dk1"/>
-                </a:solidFill>
-                <a:latin typeface="+mn-lt"/>
-                <a:ea typeface="+mn-ea"/>
-                <a:cs typeface="+mn-cs"/>
-              </a:defRPr>
-            </a:lvl4pPr>
-            <a:lvl5pPr marL="1828800" algn="l" defTabSz="914400" rtl="0" eaLnBrk="1" latinLnBrk="0" hangingPunct="1">
-              <a:defRPr sz="1800" kern="1200">
-                <a:solidFill>
-                  <a:schemeClr val="dk1"/>
-                </a:solidFill>
-                <a:latin typeface="+mn-lt"/>
-                <a:ea typeface="+mn-ea"/>
-                <a:cs typeface="+mn-cs"/>
-              </a:defRPr>
-            </a:lvl5pPr>
-            <a:lvl6pPr marL="2286000" algn="l" defTabSz="914400" rtl="0" eaLnBrk="1" latinLnBrk="0" hangingPunct="1">
-              <a:defRPr sz="1800" kern="1200">
-                <a:solidFill>
-                  <a:schemeClr val="dk1"/>
-                </a:solidFill>
-                <a:latin typeface="+mn-lt"/>
-                <a:ea typeface="+mn-ea"/>
-                <a:cs typeface="+mn-cs"/>
-              </a:defRPr>
-            </a:lvl6pPr>
-            <a:lvl7pPr marL="2743200" algn="l" defTabSz="914400" rtl="0" eaLnBrk="1" latinLnBrk="0" hangingPunct="1">
-              <a:defRPr sz="1800" kern="1200">
-                <a:solidFill>
-                  <a:schemeClr val="dk1"/>
-                </a:solidFill>
-                <a:latin typeface="+mn-lt"/>
-                <a:ea typeface="+mn-ea"/>
-                <a:cs typeface="+mn-cs"/>
-              </a:defRPr>
-            </a:lvl7pPr>
-            <a:lvl8pPr marL="3200400" algn="l" defTabSz="914400" rtl="0" eaLnBrk="1" latinLnBrk="0" hangingPunct="1">
-              <a:defRPr sz="1800" kern="1200">
-                <a:solidFill>
-                  <a:schemeClr val="dk1"/>
-                </a:solidFill>
-                <a:latin typeface="+mn-lt"/>
-                <a:ea typeface="+mn-ea"/>
-                <a:cs typeface="+mn-cs"/>
-              </a:defRPr>
-            </a:lvl8pPr>
-            <a:lvl9pPr marL="3657600" algn="l" defTabSz="914400" rtl="0" eaLnBrk="1" latinLnBrk="0" hangingPunct="1">
-              <a:defRPr sz="1800" kern="1200">
-                <a:solidFill>
-                  <a:schemeClr val="dk1"/>
-                </a:solidFill>
-                <a:latin typeface="+mn-lt"/>
-                <a:ea typeface="+mn-ea"/>
-                <a:cs typeface="+mn-cs"/>
-              </a:defRPr>
-            </a:lvl9pPr>
-          </a:lstStyle>
-          <a:p>
-            <a:pPr algn="ctr"/>
-            <a:r>
-              <a:rPr lang="en-US" sz="1600" dirty="0">
-                <a:solidFill>
-                  <a:schemeClr val="bg1"/>
-                </a:solidFill>
-              </a:rPr>
-              <a:t>:</a:t>
-            </a:r>
-            <a:r>
-              <a:rPr lang="en-US" sz="1600" dirty="0" err="1">
-                <a:solidFill>
-                  <a:schemeClr val="bg1"/>
-                </a:solidFill>
-              </a:rPr>
-              <a:t>ModelManager</a:t>
-            </a:r>
-            <a:endParaRPr lang="en-SG" sz="1600" dirty="0">
-              <a:solidFill>
-                <a:schemeClr val="bg1"/>
-              </a:solidFill>
-            </a:endParaRPr>
-          </a:p>
-        </p:txBody>
-      </p:sp>
-      <p:cxnSp>
-        <p:nvCxnSpPr>
-          <p:cNvPr id="42" name="Straight Connector 41">
-            <a:extLst>
-              <a:ext uri="{FF2B5EF4-FFF2-40B4-BE49-F238E27FC236}">
-                <a16:creationId xmlns:a16="http://schemas.microsoft.com/office/drawing/2014/main" id="{CF2D1038-E33D-419F-B613-25A9945127B2}"/>
-              </a:ext>
-            </a:extLst>
-          </p:cNvPr>
-          <p:cNvCxnSpPr>
-            <a:cxnSpLocks/>
-          </p:cNvCxnSpPr>
-          <p:nvPr/>
-        </p:nvCxnSpPr>
-        <p:spPr>
-          <a:xfrm>
-            <a:off x="2049942" y="1078249"/>
-            <a:ext cx="5203" cy="5502349"/>
-          </a:xfrm>
-          <a:prstGeom prst="line">
-            <a:avLst/>
-          </a:prstGeom>
-          <a:ln w="19050">
-            <a:solidFill>
-              <a:schemeClr val="tx1"/>
-            </a:solidFill>
-            <a:prstDash val="sysDash"/>
-          </a:ln>
-          <a:effectLst/>
-        </p:spPr>
-        <p:style>
-          <a:lnRef idx="1">
-            <a:schemeClr val="accent1"/>
-          </a:lnRef>
-          <a:fillRef idx="2">
-            <a:schemeClr val="accent1"/>
-          </a:fillRef>
-          <a:effectRef idx="1">
-            <a:schemeClr val="accent1"/>
-          </a:effectRef>
-          <a:fontRef idx="minor">
-            <a:schemeClr val="dk1"/>
-          </a:fontRef>
-        </p:style>
-      </p:cxnSp>
-      <p:sp>
-        <p:nvSpPr>
-          <p:cNvPr id="43" name="Rectangle 42">
-            <a:extLst>
-              <a:ext uri="{FF2B5EF4-FFF2-40B4-BE49-F238E27FC236}">
-                <a16:creationId xmlns:a16="http://schemas.microsoft.com/office/drawing/2014/main" id="{4CEFA31C-344E-46A4-A2D5-19D9DF7AD1C5}"/>
-              </a:ext>
-            </a:extLst>
-          </p:cNvPr>
-          <p:cNvSpPr/>
-          <p:nvPr/>
-        </p:nvSpPr>
-        <p:spPr>
-          <a:xfrm>
-            <a:off x="1977933" y="1428943"/>
-            <a:ext cx="159243" cy="4946172"/>
-          </a:xfrm>
-          <a:prstGeom prst="rect">
-            <a:avLst/>
-          </a:prstGeom>
-          <a:solidFill>
-            <a:srgbClr val="FF0000"/>
+            <a:srgbClr val="F8CECC"/>
           </a:solidFill>
           <a:ln>
             <a:solidFill>
@@ -3862,179 +3502,12 @@
           </a:p>
         </p:txBody>
       </p:sp>
-      <p:sp>
-        <p:nvSpPr>
-          <p:cNvPr id="44" name="Rectangle 43">
-            <a:extLst>
-              <a:ext uri="{FF2B5EF4-FFF2-40B4-BE49-F238E27FC236}">
-                <a16:creationId xmlns:a16="http://schemas.microsoft.com/office/drawing/2014/main" id="{82CF73DC-C8B2-44F1-8666-8418ABCE8178}"/>
-              </a:ext>
-            </a:extLst>
-          </p:cNvPr>
-          <p:cNvSpPr/>
-          <p:nvPr/>
-        </p:nvSpPr>
-        <p:spPr>
-          <a:xfrm>
-            <a:off x="3098831" y="1249309"/>
-            <a:ext cx="1422051" cy="467684"/>
-          </a:xfrm>
-          <a:prstGeom prst="rect">
-            <a:avLst/>
-          </a:prstGeom>
-          <a:solidFill>
-            <a:srgbClr val="FF0000"/>
-          </a:solidFill>
-          <a:ln w="19050">
-            <a:solidFill>
-              <a:schemeClr val="tx1"/>
-            </a:solidFill>
-          </a:ln>
-          <a:effectLst/>
-        </p:spPr>
-        <p:style>
-          <a:lnRef idx="1">
-            <a:schemeClr val="accent2"/>
-          </a:lnRef>
-          <a:fillRef idx="2">
-            <a:schemeClr val="accent2"/>
-          </a:fillRef>
-          <a:effectRef idx="1">
-            <a:schemeClr val="accent2"/>
-          </a:effectRef>
-          <a:fontRef idx="minor">
-            <a:schemeClr val="dk1"/>
-          </a:fontRef>
-        </p:style>
-        <p:txBody>
-          <a:bodyPr rtlCol="0" anchor="ctr"/>
-          <a:lstStyle>
-            <a:defPPr>
-              <a:defRPr lang="en-US"/>
-            </a:defPPr>
-            <a:lvl1pPr marL="0" algn="l" defTabSz="914400" rtl="0" eaLnBrk="1" latinLnBrk="0" hangingPunct="1">
-              <a:defRPr sz="1800" kern="1200">
-                <a:solidFill>
-                  <a:schemeClr val="dk1"/>
-                </a:solidFill>
-                <a:latin typeface="+mn-lt"/>
-                <a:ea typeface="+mn-ea"/>
-                <a:cs typeface="+mn-cs"/>
-              </a:defRPr>
-            </a:lvl1pPr>
-            <a:lvl2pPr marL="457200" algn="l" defTabSz="914400" rtl="0" eaLnBrk="1" latinLnBrk="0" hangingPunct="1">
-              <a:defRPr sz="1800" kern="1200">
-                <a:solidFill>
-                  <a:schemeClr val="dk1"/>
-                </a:solidFill>
-                <a:latin typeface="+mn-lt"/>
-                <a:ea typeface="+mn-ea"/>
-                <a:cs typeface="+mn-cs"/>
-              </a:defRPr>
-            </a:lvl2pPr>
-            <a:lvl3pPr marL="914400" algn="l" defTabSz="914400" rtl="0" eaLnBrk="1" latinLnBrk="0" hangingPunct="1">
-              <a:defRPr sz="1800" kern="1200">
-                <a:solidFill>
-                  <a:schemeClr val="dk1"/>
-                </a:solidFill>
-                <a:latin typeface="+mn-lt"/>
-                <a:ea typeface="+mn-ea"/>
-                <a:cs typeface="+mn-cs"/>
-              </a:defRPr>
-            </a:lvl3pPr>
-            <a:lvl4pPr marL="1371600" algn="l" defTabSz="914400" rtl="0" eaLnBrk="1" latinLnBrk="0" hangingPunct="1">
-              <a:defRPr sz="1800" kern="1200">
-                <a:solidFill>
-                  <a:schemeClr val="dk1"/>
-                </a:solidFill>
-                <a:latin typeface="+mn-lt"/>
-                <a:ea typeface="+mn-ea"/>
-                <a:cs typeface="+mn-cs"/>
-              </a:defRPr>
-            </a:lvl4pPr>
-            <a:lvl5pPr marL="1828800" algn="l" defTabSz="914400" rtl="0" eaLnBrk="1" latinLnBrk="0" hangingPunct="1">
-              <a:defRPr sz="1800" kern="1200">
-                <a:solidFill>
-                  <a:schemeClr val="dk1"/>
-                </a:solidFill>
-                <a:latin typeface="+mn-lt"/>
-                <a:ea typeface="+mn-ea"/>
-                <a:cs typeface="+mn-cs"/>
-              </a:defRPr>
-            </a:lvl5pPr>
-            <a:lvl6pPr marL="2286000" algn="l" defTabSz="914400" rtl="0" eaLnBrk="1" latinLnBrk="0" hangingPunct="1">
-              <a:defRPr sz="1800" kern="1200">
-                <a:solidFill>
-                  <a:schemeClr val="dk1"/>
-                </a:solidFill>
-                <a:latin typeface="+mn-lt"/>
-                <a:ea typeface="+mn-ea"/>
-                <a:cs typeface="+mn-cs"/>
-              </a:defRPr>
-            </a:lvl6pPr>
-            <a:lvl7pPr marL="2743200" algn="l" defTabSz="914400" rtl="0" eaLnBrk="1" latinLnBrk="0" hangingPunct="1">
-              <a:defRPr sz="1800" kern="1200">
-                <a:solidFill>
-                  <a:schemeClr val="dk1"/>
-                </a:solidFill>
-                <a:latin typeface="+mn-lt"/>
-                <a:ea typeface="+mn-ea"/>
-                <a:cs typeface="+mn-cs"/>
-              </a:defRPr>
-            </a:lvl7pPr>
-            <a:lvl8pPr marL="3200400" algn="l" defTabSz="914400" rtl="0" eaLnBrk="1" latinLnBrk="0" hangingPunct="1">
-              <a:defRPr sz="1800" kern="1200">
-                <a:solidFill>
-                  <a:schemeClr val="dk1"/>
-                </a:solidFill>
-                <a:latin typeface="+mn-lt"/>
-                <a:ea typeface="+mn-ea"/>
-                <a:cs typeface="+mn-cs"/>
-              </a:defRPr>
-            </a:lvl8pPr>
-            <a:lvl9pPr marL="3657600" algn="l" defTabSz="914400" rtl="0" eaLnBrk="1" latinLnBrk="0" hangingPunct="1">
-              <a:defRPr sz="1800" kern="1200">
-                <a:solidFill>
-                  <a:schemeClr val="dk1"/>
-                </a:solidFill>
-                <a:latin typeface="+mn-lt"/>
-                <a:ea typeface="+mn-ea"/>
-                <a:cs typeface="+mn-cs"/>
-              </a:defRPr>
-            </a:lvl9pPr>
-          </a:lstStyle>
-          <a:p>
-            <a:pPr algn="ctr"/>
-            <a:r>
-              <a:rPr lang="en-US" sz="1600" dirty="0">
-                <a:solidFill>
-                  <a:schemeClr val="bg1"/>
-                </a:solidFill>
-              </a:rPr>
-              <a:t>:Address</a:t>
-            </a:r>
-            <a:r>
-              <a:rPr lang="en-SG" sz="1600" dirty="0">
-                <a:solidFill>
-                  <a:schemeClr val="bg1"/>
-                </a:solidFill>
-              </a:rPr>
-              <a:t>Book</a:t>
-            </a:r>
-            <a:endParaRPr lang="en-US" sz="1600" dirty="0">
-              <a:solidFill>
-                <a:schemeClr val="bg1"/>
-              </a:solidFill>
-            </a:endParaRPr>
-          </a:p>
-        </p:txBody>
-      </p:sp>
       <p:cxnSp>
         <p:nvCxnSpPr>
-          <p:cNvPr id="49" name="Straight Arrow Connector 48">
-            <a:extLst>
-              <a:ext uri="{FF2B5EF4-FFF2-40B4-BE49-F238E27FC236}">
-                <a16:creationId xmlns:a16="http://schemas.microsoft.com/office/drawing/2014/main" id="{AABD04FF-9CC4-4634-A4CC-075C6FCBF0C0}"/>
+          <p:cNvPr id="99" name="Straight Connector 98">
+            <a:extLst>
+              <a:ext uri="{FF2B5EF4-FFF2-40B4-BE49-F238E27FC236}">
+                <a16:creationId xmlns:a16="http://schemas.microsoft.com/office/drawing/2014/main" id="{E3B44BED-AB24-47EF-BDF9-58848362BAD9}"/>
               </a:ext>
             </a:extLst>
           </p:cNvPr>
@@ -4045,131 +3518,8 @@
         </p:nvCxnSpPr>
         <p:spPr>
           <a:xfrm>
-            <a:off x="2130334" y="2191547"/>
-            <a:ext cx="1602319" cy="19199"/>
-          </a:xfrm>
-          <a:prstGeom prst="straightConnector1">
-            <a:avLst/>
-          </a:prstGeom>
-          <a:ln w="19050">
-            <a:solidFill>
-              <a:schemeClr val="tx1"/>
-            </a:solidFill>
-            <a:tailEnd type="arrow"/>
-          </a:ln>
-        </p:spPr>
-        <p:style>
-          <a:lnRef idx="1">
-            <a:schemeClr val="accent1"/>
-          </a:lnRef>
-          <a:fillRef idx="0">
-            <a:schemeClr val="accent1"/>
-          </a:fillRef>
-          <a:effectRef idx="0">
-            <a:schemeClr val="accent1"/>
-          </a:effectRef>
-          <a:fontRef idx="minor">
-            <a:schemeClr val="tx1"/>
-          </a:fontRef>
-        </p:style>
-      </p:cxnSp>
-      <p:cxnSp>
-        <p:nvCxnSpPr>
-          <p:cNvPr id="79" name="Straight Arrow Connector 78">
-            <a:extLst>
-              <a:ext uri="{FF2B5EF4-FFF2-40B4-BE49-F238E27FC236}">
-                <a16:creationId xmlns:a16="http://schemas.microsoft.com/office/drawing/2014/main" id="{24262548-1420-4BEB-98E2-A089E425A3F2}"/>
-              </a:ext>
-            </a:extLst>
-          </p:cNvPr>
-          <p:cNvCxnSpPr>
-            <a:cxnSpLocks/>
-          </p:cNvCxnSpPr>
-          <p:nvPr/>
-        </p:nvCxnSpPr>
-        <p:spPr>
-          <a:xfrm>
-            <a:off x="230044" y="1543026"/>
-            <a:ext cx="1518776" cy="0"/>
-          </a:xfrm>
-          <a:prstGeom prst="straightConnector1">
-            <a:avLst/>
-          </a:prstGeom>
-          <a:ln w="19050">
-            <a:solidFill>
-              <a:schemeClr val="tx1"/>
-            </a:solidFill>
-            <a:tailEnd type="arrow"/>
-          </a:ln>
-        </p:spPr>
-        <p:style>
-          <a:lnRef idx="1">
-            <a:schemeClr val="accent1"/>
-          </a:lnRef>
-          <a:fillRef idx="0">
-            <a:schemeClr val="accent1"/>
-          </a:fillRef>
-          <a:effectRef idx="0">
-            <a:schemeClr val="accent1"/>
-          </a:effectRef>
-          <a:fontRef idx="minor">
-            <a:schemeClr val="tx1"/>
-          </a:fontRef>
-        </p:style>
-      </p:cxnSp>
-      <p:sp>
-        <p:nvSpPr>
-          <p:cNvPr id="81" name="TextBox 80">
-            <a:extLst>
-              <a:ext uri="{FF2B5EF4-FFF2-40B4-BE49-F238E27FC236}">
-                <a16:creationId xmlns:a16="http://schemas.microsoft.com/office/drawing/2014/main" id="{5FA647BB-CFEB-42D3-8A71-5ED5CC5380C2}"/>
-              </a:ext>
-            </a:extLst>
-          </p:cNvPr>
-          <p:cNvSpPr txBox="1"/>
-          <p:nvPr/>
-        </p:nvSpPr>
-        <p:spPr>
-          <a:xfrm>
-            <a:off x="-19799" y="1090954"/>
-            <a:ext cx="2074944" cy="246221"/>
-          </a:xfrm>
-          <a:prstGeom prst="rect">
-            <a:avLst/>
-          </a:prstGeom>
-          <a:noFill/>
-        </p:spPr>
-        <p:txBody>
-          <a:bodyPr wrap="square" rtlCol="0">
-            <a:spAutoFit/>
-          </a:bodyPr>
-          <a:lstStyle/>
-          <a:p>
-            <a:r>
-              <a:rPr lang="en-SG" sz="1000" dirty="0"/>
-              <a:t>addAppointment(appointment)</a:t>
-            </a:r>
-          </a:p>
-        </p:txBody>
-      </p:sp>
-      <p:cxnSp>
-        <p:nvCxnSpPr>
-          <p:cNvPr id="82" name="Straight Connector 81">
-            <a:extLst>
-              <a:ext uri="{FF2B5EF4-FFF2-40B4-BE49-F238E27FC236}">
-                <a16:creationId xmlns:a16="http://schemas.microsoft.com/office/drawing/2014/main" id="{726D5954-1910-4A5B-80B9-A4158F9DBF7A}"/>
-              </a:ext>
-            </a:extLst>
-          </p:cNvPr>
-          <p:cNvCxnSpPr>
-            <a:cxnSpLocks/>
-          </p:cNvCxnSpPr>
-          <p:nvPr/>
-        </p:nvCxnSpPr>
-        <p:spPr>
-          <a:xfrm>
-            <a:off x="3809856" y="1856319"/>
-            <a:ext cx="0" cy="4380094"/>
+            <a:off x="8295585" y="1327106"/>
+            <a:ext cx="0" cy="4082238"/>
           </a:xfrm>
           <a:prstGeom prst="line">
             <a:avLst/>
@@ -4197,12 +3547,57 @@
           </a:fontRef>
         </p:style>
       </p:cxnSp>
-      <p:sp>
-        <p:nvSpPr>
-          <p:cNvPr id="83" name="Rectangle 82">
-            <a:extLst>
-              <a:ext uri="{FF2B5EF4-FFF2-40B4-BE49-F238E27FC236}">
-                <a16:creationId xmlns:a16="http://schemas.microsoft.com/office/drawing/2014/main" id="{E6F968BF-5441-4AC3-BF0A-5716D47D5F89}"/>
+      <p:cxnSp>
+        <p:nvCxnSpPr>
+          <p:cNvPr id="95" name="Straight Connector 94">
+            <a:extLst>
+              <a:ext uri="{FF2B5EF4-FFF2-40B4-BE49-F238E27FC236}">
+                <a16:creationId xmlns:a16="http://schemas.microsoft.com/office/drawing/2014/main" id="{868ACABD-8985-41FF-BB8E-91B827AD8916}"/>
+              </a:ext>
+            </a:extLst>
+          </p:cNvPr>
+          <p:cNvCxnSpPr>
+            <a:cxnSpLocks/>
+          </p:cNvCxnSpPr>
+          <p:nvPr/>
+        </p:nvCxnSpPr>
+        <p:spPr>
+          <a:xfrm>
+            <a:off x="11476283" y="2153095"/>
+            <a:ext cx="0" cy="5622863"/>
+          </a:xfrm>
+          <a:prstGeom prst="line">
+            <a:avLst/>
+          </a:prstGeom>
+          <a:ln w="19050">
+            <a:solidFill>
+              <a:schemeClr val="tx1"/>
+            </a:solidFill>
+            <a:prstDash val="sysDash"/>
+          </a:ln>
+          <a:effectLst/>
+        </p:spPr>
+        <p:style>
+          <a:lnRef idx="1">
+            <a:schemeClr val="accent1"/>
+          </a:lnRef>
+          <a:fillRef idx="2">
+            <a:schemeClr val="accent1"/>
+          </a:fillRef>
+          <a:effectRef idx="1">
+            <a:schemeClr val="accent1"/>
+          </a:effectRef>
+          <a:fontRef idx="minor">
+            <a:schemeClr val="dk1"/>
+          </a:fontRef>
+        </p:style>
+      </p:cxnSp>
+      <p:sp>
+        <p:nvSpPr>
+          <p:cNvPr id="93" name="Rectangle 92">
+            <a:extLst>
+              <a:ext uri="{FF2B5EF4-FFF2-40B4-BE49-F238E27FC236}">
+                <a16:creationId xmlns:a16="http://schemas.microsoft.com/office/drawing/2014/main" id="{D3BA4C3E-AC68-49E9-85B4-939D7E1B9F09}"/>
               </a:ext>
             </a:extLst>
           </p:cNvPr>
@@ -4211,14 +3606,14 @@
         </p:nvSpPr>
         <p:spPr>
           <a:xfrm>
-            <a:off x="3732652" y="2176368"/>
-            <a:ext cx="166703" cy="3597707"/>
+            <a:off x="11412331" y="2276976"/>
+            <a:ext cx="127904" cy="287759"/>
           </a:xfrm>
           <a:prstGeom prst="rect">
             <a:avLst/>
           </a:prstGeom>
           <a:solidFill>
-            <a:srgbClr val="FF0000"/>
+            <a:srgbClr val="F8CECC"/>
           </a:solidFill>
           <a:ln>
             <a:solidFill>
@@ -4348,241 +3743,12 @@
           </a:p>
         </p:txBody>
       </p:sp>
-      <p:sp>
-        <p:nvSpPr>
-          <p:cNvPr id="84" name="TextBox 83">
-            <a:extLst>
-              <a:ext uri="{FF2B5EF4-FFF2-40B4-BE49-F238E27FC236}">
-                <a16:creationId xmlns:a16="http://schemas.microsoft.com/office/drawing/2014/main" id="{43EB746D-E6BC-4120-B04B-4FDCDBB23BCF}"/>
-              </a:ext>
-            </a:extLst>
-          </p:cNvPr>
-          <p:cNvSpPr txBox="1"/>
-          <p:nvPr/>
-        </p:nvSpPr>
-        <p:spPr>
-          <a:xfrm>
-            <a:off x="2201513" y="1870401"/>
-            <a:ext cx="2074944" cy="215444"/>
-          </a:xfrm>
-          <a:prstGeom prst="rect">
-            <a:avLst/>
-          </a:prstGeom>
-          <a:noFill/>
-        </p:spPr>
-        <p:txBody>
-          <a:bodyPr wrap="square" rtlCol="0">
-            <a:spAutoFit/>
-          </a:bodyPr>
-          <a:lstStyle/>
-          <a:p>
-            <a:r>
-              <a:rPr lang="en-SG" sz="800" dirty="0"/>
-              <a:t>addAppointment(appointment)</a:t>
-            </a:r>
-          </a:p>
-        </p:txBody>
-      </p:sp>
-      <p:sp>
-        <p:nvSpPr>
-          <p:cNvPr id="87" name="Rectangle 86">
-            <a:extLst>
-              <a:ext uri="{FF2B5EF4-FFF2-40B4-BE49-F238E27FC236}">
-                <a16:creationId xmlns:a16="http://schemas.microsoft.com/office/drawing/2014/main" id="{E675E05E-BA7E-465A-BCA6-CAEC50A3F1A8}"/>
-              </a:ext>
-            </a:extLst>
-          </p:cNvPr>
-          <p:cNvSpPr/>
-          <p:nvPr/>
-        </p:nvSpPr>
-        <p:spPr>
-          <a:xfrm>
-            <a:off x="4687693" y="1255455"/>
-            <a:ext cx="1803548" cy="461538"/>
-          </a:xfrm>
-          <a:prstGeom prst="rect">
-            <a:avLst/>
-          </a:prstGeom>
-          <a:solidFill>
-            <a:srgbClr val="FF0000"/>
-          </a:solidFill>
-          <a:ln w="19050">
-            <a:solidFill>
-              <a:schemeClr val="tx1"/>
-            </a:solidFill>
-          </a:ln>
-          <a:effectLst/>
-        </p:spPr>
-        <p:style>
-          <a:lnRef idx="1">
-            <a:schemeClr val="accent2"/>
-          </a:lnRef>
-          <a:fillRef idx="2">
-            <a:schemeClr val="accent2"/>
-          </a:fillRef>
-          <a:effectRef idx="1">
-            <a:schemeClr val="accent2"/>
-          </a:effectRef>
-          <a:fontRef idx="minor">
-            <a:schemeClr val="dk1"/>
-          </a:fontRef>
-        </p:style>
-        <p:txBody>
-          <a:bodyPr rtlCol="0" anchor="ctr"/>
-          <a:lstStyle>
-            <a:defPPr>
-              <a:defRPr lang="en-US"/>
-            </a:defPPr>
-            <a:lvl1pPr marL="0" algn="l" defTabSz="914400" rtl="0" eaLnBrk="1" latinLnBrk="0" hangingPunct="1">
-              <a:defRPr sz="1800" kern="1200">
-                <a:solidFill>
-                  <a:schemeClr val="dk1"/>
-                </a:solidFill>
-                <a:latin typeface="+mn-lt"/>
-                <a:ea typeface="+mn-ea"/>
-                <a:cs typeface="+mn-cs"/>
-              </a:defRPr>
-            </a:lvl1pPr>
-            <a:lvl2pPr marL="457200" algn="l" defTabSz="914400" rtl="0" eaLnBrk="1" latinLnBrk="0" hangingPunct="1">
-              <a:defRPr sz="1800" kern="1200">
-                <a:solidFill>
-                  <a:schemeClr val="dk1"/>
-                </a:solidFill>
-                <a:latin typeface="+mn-lt"/>
-                <a:ea typeface="+mn-ea"/>
-                <a:cs typeface="+mn-cs"/>
-              </a:defRPr>
-            </a:lvl2pPr>
-            <a:lvl3pPr marL="914400" algn="l" defTabSz="914400" rtl="0" eaLnBrk="1" latinLnBrk="0" hangingPunct="1">
-              <a:defRPr sz="1800" kern="1200">
-                <a:solidFill>
-                  <a:schemeClr val="dk1"/>
-                </a:solidFill>
-                <a:latin typeface="+mn-lt"/>
-                <a:ea typeface="+mn-ea"/>
-                <a:cs typeface="+mn-cs"/>
-              </a:defRPr>
-            </a:lvl3pPr>
-            <a:lvl4pPr marL="1371600" algn="l" defTabSz="914400" rtl="0" eaLnBrk="1" latinLnBrk="0" hangingPunct="1">
-              <a:defRPr sz="1800" kern="1200">
-                <a:solidFill>
-                  <a:schemeClr val="dk1"/>
-                </a:solidFill>
-                <a:latin typeface="+mn-lt"/>
-                <a:ea typeface="+mn-ea"/>
-                <a:cs typeface="+mn-cs"/>
-              </a:defRPr>
-            </a:lvl4pPr>
-            <a:lvl5pPr marL="1828800" algn="l" defTabSz="914400" rtl="0" eaLnBrk="1" latinLnBrk="0" hangingPunct="1">
-              <a:defRPr sz="1800" kern="1200">
-                <a:solidFill>
-                  <a:schemeClr val="dk1"/>
-                </a:solidFill>
-                <a:latin typeface="+mn-lt"/>
-                <a:ea typeface="+mn-ea"/>
-                <a:cs typeface="+mn-cs"/>
-              </a:defRPr>
-            </a:lvl5pPr>
-            <a:lvl6pPr marL="2286000" algn="l" defTabSz="914400" rtl="0" eaLnBrk="1" latinLnBrk="0" hangingPunct="1">
-              <a:defRPr sz="1800" kern="1200">
-                <a:solidFill>
-                  <a:schemeClr val="dk1"/>
-                </a:solidFill>
-                <a:latin typeface="+mn-lt"/>
-                <a:ea typeface="+mn-ea"/>
-                <a:cs typeface="+mn-cs"/>
-              </a:defRPr>
-            </a:lvl6pPr>
-            <a:lvl7pPr marL="2743200" algn="l" defTabSz="914400" rtl="0" eaLnBrk="1" latinLnBrk="0" hangingPunct="1">
-              <a:defRPr sz="1800" kern="1200">
-                <a:solidFill>
-                  <a:schemeClr val="dk1"/>
-                </a:solidFill>
-                <a:latin typeface="+mn-lt"/>
-                <a:ea typeface="+mn-ea"/>
-                <a:cs typeface="+mn-cs"/>
-              </a:defRPr>
-            </a:lvl7pPr>
-            <a:lvl8pPr marL="3200400" algn="l" defTabSz="914400" rtl="0" eaLnBrk="1" latinLnBrk="0" hangingPunct="1">
-              <a:defRPr sz="1800" kern="1200">
-                <a:solidFill>
-                  <a:schemeClr val="dk1"/>
-                </a:solidFill>
-                <a:latin typeface="+mn-lt"/>
-                <a:ea typeface="+mn-ea"/>
-                <a:cs typeface="+mn-cs"/>
-              </a:defRPr>
-            </a:lvl8pPr>
-            <a:lvl9pPr marL="3657600" algn="l" defTabSz="914400" rtl="0" eaLnBrk="1" latinLnBrk="0" hangingPunct="1">
-              <a:defRPr sz="1800" kern="1200">
-                <a:solidFill>
-                  <a:schemeClr val="dk1"/>
-                </a:solidFill>
-                <a:latin typeface="+mn-lt"/>
-                <a:ea typeface="+mn-ea"/>
-                <a:cs typeface="+mn-cs"/>
-              </a:defRPr>
-            </a:lvl9pPr>
-          </a:lstStyle>
-          <a:p>
-            <a:pPr algn="ctr"/>
-            <a:r>
-              <a:rPr lang="en-US" sz="1600" dirty="0">
-                <a:solidFill>
-                  <a:schemeClr val="bg1"/>
-                </a:solidFill>
-              </a:rPr>
-              <a:t>:UniquePersonList</a:t>
-            </a:r>
-            <a:endParaRPr lang="en-SG" sz="1600" dirty="0">
-              <a:solidFill>
-                <a:schemeClr val="bg1"/>
-              </a:solidFill>
-            </a:endParaRPr>
-          </a:p>
-        </p:txBody>
-      </p:sp>
-      <p:sp>
-        <p:nvSpPr>
-          <p:cNvPr id="88" name="TextBox 87">
-            <a:extLst>
-              <a:ext uri="{FF2B5EF4-FFF2-40B4-BE49-F238E27FC236}">
-                <a16:creationId xmlns:a16="http://schemas.microsoft.com/office/drawing/2014/main" id="{6152D771-6E20-4DE4-9CFE-B8638ADECD7F}"/>
-              </a:ext>
-            </a:extLst>
-          </p:cNvPr>
-          <p:cNvSpPr txBox="1"/>
-          <p:nvPr/>
-        </p:nvSpPr>
-        <p:spPr>
-          <a:xfrm>
-            <a:off x="3878036" y="1884483"/>
-            <a:ext cx="2074944" cy="215444"/>
-          </a:xfrm>
-          <a:prstGeom prst="rect">
-            <a:avLst/>
-          </a:prstGeom>
-          <a:noFill/>
-        </p:spPr>
-        <p:txBody>
-          <a:bodyPr wrap="square" rtlCol="0">
-            <a:spAutoFit/>
-          </a:bodyPr>
-          <a:lstStyle/>
-          <a:p>
-            <a:r>
-              <a:rPr lang="en-SG" sz="800" dirty="0"/>
-              <a:t>addAppointment(appointment)</a:t>
-            </a:r>
-          </a:p>
-        </p:txBody>
-      </p:sp>
       <p:cxnSp>
         <p:nvCxnSpPr>
-          <p:cNvPr id="89" name="Straight Arrow Connector 88">
-            <a:extLst>
-              <a:ext uri="{FF2B5EF4-FFF2-40B4-BE49-F238E27FC236}">
-                <a16:creationId xmlns:a16="http://schemas.microsoft.com/office/drawing/2014/main" id="{2EC2935F-AA3D-4759-A4D3-F06536BD3768}"/>
+          <p:cNvPr id="69" name="Straight Connector 68">
+            <a:extLst>
+              <a:ext uri="{FF2B5EF4-FFF2-40B4-BE49-F238E27FC236}">
+                <a16:creationId xmlns:a16="http://schemas.microsoft.com/office/drawing/2014/main" id="{49371D79-9DE2-4FFD-B177-831EC3A53CD7}"/>
               </a:ext>
             </a:extLst>
           </p:cNvPr>
@@ -4592,53 +3758,9 @@
           <p:nvPr/>
         </p:nvCxnSpPr>
         <p:spPr>
-          <a:xfrm flipV="1">
-            <a:off x="3891665" y="2349625"/>
-            <a:ext cx="1459884" cy="377"/>
-          </a:xfrm>
-          <a:prstGeom prst="straightConnector1">
-            <a:avLst/>
-          </a:prstGeom>
-          <a:ln w="19050">
-            <a:solidFill>
-              <a:schemeClr val="tx1"/>
-            </a:solidFill>
-            <a:tailEnd type="arrow"/>
-          </a:ln>
-        </p:spPr>
-        <p:style>
-          <a:lnRef idx="1">
-            <a:schemeClr val="accent1"/>
-          </a:lnRef>
-          <a:fillRef idx="0">
-            <a:schemeClr val="accent1"/>
-          </a:fillRef>
-          <a:effectRef idx="0">
-            <a:schemeClr val="accent1"/>
-          </a:effectRef>
-          <a:fontRef idx="minor">
-            <a:schemeClr val="tx1"/>
-          </a:fontRef>
-        </p:style>
-      </p:cxnSp>
-      <p:cxnSp>
-        <p:nvCxnSpPr>
-          <p:cNvPr id="91" name="Straight Connector 90">
-            <a:extLst>
-              <a:ext uri="{FF2B5EF4-FFF2-40B4-BE49-F238E27FC236}">
-                <a16:creationId xmlns:a16="http://schemas.microsoft.com/office/drawing/2014/main" id="{3A7778AE-AAE7-41BE-875F-68A26A896606}"/>
-              </a:ext>
-            </a:extLst>
-          </p:cNvPr>
-          <p:cNvCxnSpPr>
-            <a:cxnSpLocks/>
-          </p:cNvCxnSpPr>
-          <p:nvPr/>
-        </p:nvCxnSpPr>
-        <p:spPr>
           <a:xfrm>
-            <a:off x="5410775" y="1825900"/>
-            <a:ext cx="0" cy="4078282"/>
+            <a:off x="4342688" y="800017"/>
+            <a:ext cx="0" cy="5622863"/>
           </a:xfrm>
           <a:prstGeom prst="line">
             <a:avLst/>
@@ -4666,6 +3788,51 @@
           </a:fontRef>
         </p:style>
       </p:cxnSp>
+      <p:cxnSp>
+        <p:nvCxnSpPr>
+          <p:cNvPr id="91" name="Straight Connector 90">
+            <a:extLst>
+              <a:ext uri="{FF2B5EF4-FFF2-40B4-BE49-F238E27FC236}">
+                <a16:creationId xmlns:a16="http://schemas.microsoft.com/office/drawing/2014/main" id="{3A7778AE-AAE7-41BE-875F-68A26A896606}"/>
+              </a:ext>
+            </a:extLst>
+          </p:cNvPr>
+          <p:cNvCxnSpPr>
+            <a:cxnSpLocks/>
+          </p:cNvCxnSpPr>
+          <p:nvPr/>
+        </p:nvCxnSpPr>
+        <p:spPr>
+          <a:xfrm>
+            <a:off x="2065430" y="1257887"/>
+            <a:ext cx="0" cy="5622863"/>
+          </a:xfrm>
+          <a:prstGeom prst="line">
+            <a:avLst/>
+          </a:prstGeom>
+          <a:ln w="19050">
+            <a:solidFill>
+              <a:schemeClr val="tx1"/>
+            </a:solidFill>
+            <a:prstDash val="sysDash"/>
+          </a:ln>
+          <a:effectLst/>
+        </p:spPr>
+        <p:style>
+          <a:lnRef idx="1">
+            <a:schemeClr val="accent1"/>
+          </a:lnRef>
+          <a:fillRef idx="2">
+            <a:schemeClr val="accent1"/>
+          </a:fillRef>
+          <a:effectRef idx="1">
+            <a:schemeClr val="accent1"/>
+          </a:effectRef>
+          <a:fontRef idx="minor">
+            <a:schemeClr val="dk1"/>
+          </a:fontRef>
+        </p:style>
+      </p:cxnSp>
       <p:sp>
         <p:nvSpPr>
           <p:cNvPr id="92" name="Rectangle 91">
@@ -4680,14 +3847,14 @@
         </p:nvSpPr>
         <p:spPr>
           <a:xfrm>
-            <a:off x="5327224" y="2148020"/>
-            <a:ext cx="162155" cy="3347947"/>
+            <a:off x="1984468" y="1507366"/>
+            <a:ext cx="161926" cy="5219643"/>
           </a:xfrm>
           <a:prstGeom prst="rect">
             <a:avLst/>
           </a:prstGeom>
           <a:solidFill>
-            <a:srgbClr val="FF0000"/>
+            <a:srgbClr val="F8CECC"/>
           </a:solidFill>
           <a:ln>
             <a:solidFill>
@@ -4819,10 +3986,10 @@
       </p:sp>
       <p:sp>
         <p:nvSpPr>
-          <p:cNvPr id="104" name="Rectangle: Single Corner Snipped 103">
-            <a:extLst>
-              <a:ext uri="{FF2B5EF4-FFF2-40B4-BE49-F238E27FC236}">
-                <a16:creationId xmlns:a16="http://schemas.microsoft.com/office/drawing/2014/main" id="{3C58BC63-E11C-4E59-9A48-AFE1F8F5E3AE}"/>
+          <p:cNvPr id="3" name="Rectangle: Rounded Corners 2">
+            <a:extLst>
+              <a:ext uri="{FF2B5EF4-FFF2-40B4-BE49-F238E27FC236}">
+                <a16:creationId xmlns:a16="http://schemas.microsoft.com/office/drawing/2014/main" id="{77A776D2-B75C-472C-B5F8-A4B48F4382A0}"/>
               </a:ext>
             </a:extLst>
           </p:cNvPr>
@@ -4831,13 +3998,15 @@
         </p:nvSpPr>
         <p:spPr>
           <a:xfrm>
-            <a:off x="4159531" y="2459057"/>
-            <a:ext cx="968364" cy="314538"/>
-          </a:xfrm>
-          <a:prstGeom prst="snip1Rect">
+            <a:off x="1025172" y="646550"/>
+            <a:ext cx="2080517" cy="582997"/>
+          </a:xfrm>
+          <a:prstGeom prst="roundRect">
             <a:avLst/>
           </a:prstGeom>
-          <a:noFill/>
+          <a:solidFill>
+            <a:srgbClr val="F8CECC"/>
+          </a:solidFill>
         </p:spPr>
         <p:style>
           <a:lnRef idx="2">
@@ -4860,16 +4029,111 @@
           <a:lstStyle/>
           <a:p>
             <a:pPr algn="ctr"/>
-            <a:endParaRPr lang="en-SG"/>
-          </a:p>
-        </p:txBody>
-      </p:sp>
-      <p:sp>
-        <p:nvSpPr>
-          <p:cNvPr id="105" name="TextBox 104">
-            <a:extLst>
-              <a:ext uri="{FF2B5EF4-FFF2-40B4-BE49-F238E27FC236}">
-                <a16:creationId xmlns:a16="http://schemas.microsoft.com/office/drawing/2014/main" id="{2682ACE3-8672-4EB7-A135-0B30440295FB}"/>
+            <a:r>
+              <a:rPr lang="en-SG" dirty="0">
+                <a:solidFill>
+                  <a:schemeClr val="tx1"/>
+                </a:solidFill>
+              </a:rPr>
+              <a:t>:UniquePersonList</a:t>
+            </a:r>
+          </a:p>
+        </p:txBody>
+      </p:sp>
+      <p:cxnSp>
+        <p:nvCxnSpPr>
+          <p:cNvPr id="46" name="Straight Arrow Connector 45">
+            <a:extLst>
+              <a:ext uri="{FF2B5EF4-FFF2-40B4-BE49-F238E27FC236}">
+                <a16:creationId xmlns:a16="http://schemas.microsoft.com/office/drawing/2014/main" id="{080046DC-327E-4835-A7D4-B23A0C741CE8}"/>
+              </a:ext>
+            </a:extLst>
+          </p:cNvPr>
+          <p:cNvCxnSpPr>
+            <a:cxnSpLocks/>
+          </p:cNvCxnSpPr>
+          <p:nvPr/>
+        </p:nvCxnSpPr>
+        <p:spPr>
+          <a:xfrm>
+            <a:off x="2256379" y="1812178"/>
+            <a:ext cx="1877296" cy="0"/>
+          </a:xfrm>
+          <a:prstGeom prst="straightConnector1">
+            <a:avLst/>
+          </a:prstGeom>
+          <a:ln w="19050">
+            <a:solidFill>
+              <a:schemeClr val="tx1"/>
+            </a:solidFill>
+            <a:tailEnd type="arrow"/>
+          </a:ln>
+        </p:spPr>
+        <p:style>
+          <a:lnRef idx="1">
+            <a:schemeClr val="accent1"/>
+          </a:lnRef>
+          <a:fillRef idx="0">
+            <a:schemeClr val="accent1"/>
+          </a:fillRef>
+          <a:effectRef idx="0">
+            <a:schemeClr val="accent1"/>
+          </a:effectRef>
+          <a:fontRef idx="minor">
+            <a:schemeClr val="tx1"/>
+          </a:fontRef>
+        </p:style>
+      </p:cxnSp>
+      <p:cxnSp>
+        <p:nvCxnSpPr>
+          <p:cNvPr id="48" name="Straight Arrow Connector 47">
+            <a:extLst>
+              <a:ext uri="{FF2B5EF4-FFF2-40B4-BE49-F238E27FC236}">
+                <a16:creationId xmlns:a16="http://schemas.microsoft.com/office/drawing/2014/main" id="{97346D9F-BD9F-443F-9212-EF3A5A138CCF}"/>
+              </a:ext>
+            </a:extLst>
+          </p:cNvPr>
+          <p:cNvCxnSpPr>
+            <a:cxnSpLocks/>
+          </p:cNvCxnSpPr>
+          <p:nvPr/>
+        </p:nvCxnSpPr>
+        <p:spPr>
+          <a:xfrm>
+            <a:off x="143023" y="1601673"/>
+            <a:ext cx="1819341" cy="0"/>
+          </a:xfrm>
+          <a:prstGeom prst="straightConnector1">
+            <a:avLst/>
+          </a:prstGeom>
+          <a:ln w="19050">
+            <a:solidFill>
+              <a:schemeClr val="tx1"/>
+            </a:solidFill>
+            <a:tailEnd type="arrow"/>
+          </a:ln>
+        </p:spPr>
+        <p:style>
+          <a:lnRef idx="1">
+            <a:schemeClr val="accent1"/>
+          </a:lnRef>
+          <a:fillRef idx="0">
+            <a:schemeClr val="accent1"/>
+          </a:fillRef>
+          <a:effectRef idx="0">
+            <a:schemeClr val="accent1"/>
+          </a:effectRef>
+          <a:fontRef idx="minor">
+            <a:schemeClr val="tx1"/>
+          </a:fontRef>
+        </p:style>
+      </p:cxnSp>
+      <p:sp>
+        <p:nvSpPr>
+          <p:cNvPr id="7" name="TextBox 6">
+            <a:extLst>
+              <a:ext uri="{FF2B5EF4-FFF2-40B4-BE49-F238E27FC236}">
+                <a16:creationId xmlns:a16="http://schemas.microsoft.com/office/drawing/2014/main" id="{A25242D3-7EB9-43D4-AE5D-44762C8789A6}"/>
               </a:ext>
             </a:extLst>
           </p:cNvPr>
@@ -4878,8 +4142,8 @@
         </p:nvSpPr>
         <p:spPr>
           <a:xfrm>
-            <a:off x="4366892" y="2539471"/>
-            <a:ext cx="975704" cy="553998"/>
+            <a:off x="6921" y="1208953"/>
+            <a:ext cx="2210035" cy="369332"/>
           </a:xfrm>
           <a:prstGeom prst="rect">
             <a:avLst/>
@@ -4893,42 +4157,76 @@
           <a:lstStyle/>
           <a:p>
             <a:r>
-              <a:rPr lang="en-SG" sz="1000" dirty="0"/>
-              <a:t>Loop</a:t>
-            </a:r>
-          </a:p>
-          <a:p>
-            <a:endParaRPr lang="en-SG" sz="1000" dirty="0"/>
-          </a:p>
-          <a:p>
-            <a:r>
-              <a:rPr lang="en-SG" sz="1000" dirty="0"/>
-              <a:t>[each person]</a:t>
-            </a:r>
-          </a:p>
-        </p:txBody>
-      </p:sp>
-      <p:sp>
-        <p:nvSpPr>
-          <p:cNvPr id="130" name="Rectangle: Single Corner Snipped 129">
-            <a:extLst>
-              <a:ext uri="{FF2B5EF4-FFF2-40B4-BE49-F238E27FC236}">
-                <a16:creationId xmlns:a16="http://schemas.microsoft.com/office/drawing/2014/main" id="{D5A84A94-A661-4BE4-A0AD-9BB2119FE15E}"/>
-              </a:ext>
-            </a:extLst>
-          </p:cNvPr>
-          <p:cNvSpPr/>
+              <a:rPr lang="en-SG" sz="900" dirty="0"/>
+              <a:t>addAppointment(ReadOnlyPerson target, </a:t>
+            </a:r>
+          </a:p>
+          <a:p>
+            <a:r>
+              <a:rPr lang="en-SG" sz="900" dirty="0"/>
+              <a:t>Appointment appointment);</a:t>
+            </a:r>
+          </a:p>
+        </p:txBody>
+      </p:sp>
+      <p:sp>
+        <p:nvSpPr>
+          <p:cNvPr id="64" name="TextBox 63">
+            <a:extLst>
+              <a:ext uri="{FF2B5EF4-FFF2-40B4-BE49-F238E27FC236}">
+                <a16:creationId xmlns:a16="http://schemas.microsoft.com/office/drawing/2014/main" id="{01E64814-41C1-48F2-82F3-21C4086F4B8A}"/>
+              </a:ext>
+            </a:extLst>
+          </p:cNvPr>
+          <p:cNvSpPr txBox="1"/>
           <p:nvPr/>
         </p:nvSpPr>
         <p:spPr>
           <a:xfrm>
-            <a:off x="4307935" y="3165153"/>
-            <a:ext cx="477085" cy="258319"/>
-          </a:xfrm>
-          <a:prstGeom prst="snip1Rect">
+            <a:off x="2250103" y="1517065"/>
+            <a:ext cx="2210035" cy="276999"/>
+          </a:xfrm>
+          <a:prstGeom prst="rect">
             <a:avLst/>
           </a:prstGeom>
           <a:noFill/>
+        </p:spPr>
+        <p:txBody>
+          <a:bodyPr wrap="square" rtlCol="0">
+            <a:spAutoFit/>
+          </a:bodyPr>
+          <a:lstStyle/>
+          <a:p>
+            <a:r>
+              <a:rPr lang="en-SG" sz="1200" dirty="0"/>
+              <a:t>getAppointment()</a:t>
+            </a:r>
+          </a:p>
+        </p:txBody>
+      </p:sp>
+      <p:sp>
+        <p:nvSpPr>
+          <p:cNvPr id="65" name="Rectangle: Rounded Corners 64">
+            <a:extLst>
+              <a:ext uri="{FF2B5EF4-FFF2-40B4-BE49-F238E27FC236}">
+                <a16:creationId xmlns:a16="http://schemas.microsoft.com/office/drawing/2014/main" id="{662826E5-4538-476E-928D-3CEBF4E41A09}"/>
+              </a:ext>
+            </a:extLst>
+          </p:cNvPr>
+          <p:cNvSpPr/>
+          <p:nvPr/>
+        </p:nvSpPr>
+        <p:spPr>
+          <a:xfrm>
+            <a:off x="3301501" y="671700"/>
+            <a:ext cx="2080517" cy="582997"/>
+          </a:xfrm>
+          <a:prstGeom prst="roundRect">
+            <a:avLst/>
+          </a:prstGeom>
+          <a:solidFill>
+            <a:srgbClr val="F8CECC"/>
+          </a:solidFill>
         </p:spPr>
         <p:style>
           <a:lnRef idx="2">
@@ -4951,66 +4249,23 @@
           <a:lstStyle/>
           <a:p>
             <a:pPr algn="ctr"/>
-            <a:endParaRPr lang="en-SG"/>
-          </a:p>
-        </p:txBody>
-      </p:sp>
-      <p:sp>
-        <p:nvSpPr>
-          <p:cNvPr id="131" name="TextBox 130">
-            <a:extLst>
-              <a:ext uri="{FF2B5EF4-FFF2-40B4-BE49-F238E27FC236}">
-                <a16:creationId xmlns:a16="http://schemas.microsoft.com/office/drawing/2014/main" id="{72D02663-C963-4C95-907A-8253E05626BD}"/>
-              </a:ext>
-            </a:extLst>
-          </p:cNvPr>
-          <p:cNvSpPr txBox="1"/>
-          <p:nvPr/>
-        </p:nvSpPr>
-        <p:spPr>
-          <a:xfrm>
-            <a:off x="4294044" y="3208028"/>
-            <a:ext cx="1048552" cy="707886"/>
-          </a:xfrm>
-          <a:prstGeom prst="rect">
-            <a:avLst/>
-          </a:prstGeom>
-          <a:noFill/>
-        </p:spPr>
-        <p:txBody>
-          <a:bodyPr wrap="square" rtlCol="0">
-            <a:spAutoFit/>
-          </a:bodyPr>
-          <a:lstStyle/>
-          <a:p>
-            <a:r>
-              <a:rPr lang="en-SG" sz="800" dirty="0"/>
-              <a:t>If</a:t>
-            </a:r>
-          </a:p>
-          <a:p>
-            <a:endParaRPr lang="en-SG" sz="800" dirty="0"/>
-          </a:p>
-          <a:p>
-            <a:r>
-              <a:rPr lang="en-SG" sz="800" dirty="0"/>
-              <a:t>person.getName() == appointment</a:t>
-            </a:r>
-          </a:p>
-          <a:p>
-            <a:r>
-              <a:rPr lang="en-SG" sz="800" dirty="0"/>
-              <a:t>.getName()</a:t>
-            </a:r>
-          </a:p>
-        </p:txBody>
-      </p:sp>
-      <p:sp>
-        <p:nvSpPr>
-          <p:cNvPr id="132" name="Arrow: Curved Left 131">
-            <a:extLst>
-              <a:ext uri="{FF2B5EF4-FFF2-40B4-BE49-F238E27FC236}">
-                <a16:creationId xmlns:a16="http://schemas.microsoft.com/office/drawing/2014/main" id="{BAF51FD6-974B-44A7-A0D9-A9E4974C1B39}"/>
+            <a:r>
+              <a:rPr lang="en-SG" dirty="0">
+                <a:solidFill>
+                  <a:schemeClr val="tx1"/>
+                </a:solidFill>
+              </a:rPr>
+              <a:t>:Person</a:t>
+            </a:r>
+          </a:p>
+        </p:txBody>
+      </p:sp>
+      <p:sp>
+        <p:nvSpPr>
+          <p:cNvPr id="67" name="Rectangle 66">
+            <a:extLst>
+              <a:ext uri="{FF2B5EF4-FFF2-40B4-BE49-F238E27FC236}">
+                <a16:creationId xmlns:a16="http://schemas.microsoft.com/office/drawing/2014/main" id="{37CC488C-3BB1-40C0-822F-B9BB39CAE631}"/>
               </a:ext>
             </a:extLst>
           </p:cNvPr>
@@ -5019,381 +4274,14 @@
         </p:nvSpPr>
         <p:spPr>
           <a:xfrm>
-            <a:off x="5489379" y="3423472"/>
-            <a:ext cx="155846" cy="938160"/>
-          </a:xfrm>
-          <a:prstGeom prst="curvedLeftArrow">
-            <a:avLst/>
-          </a:prstGeom>
-        </p:spPr>
-        <p:style>
-          <a:lnRef idx="2">
-            <a:schemeClr val="accent1">
-              <a:shade val="50000"/>
-            </a:schemeClr>
-          </a:lnRef>
-          <a:fillRef idx="1">
-            <a:schemeClr val="accent1"/>
-          </a:fillRef>
-          <a:effectRef idx="0">
-            <a:schemeClr val="accent1"/>
-          </a:effectRef>
-          <a:fontRef idx="minor">
-            <a:schemeClr val="lt1"/>
-          </a:fontRef>
-        </p:style>
-        <p:txBody>
-          <a:bodyPr rtlCol="0" anchor="ctr"/>
-          <a:lstStyle/>
-          <a:p>
-            <a:pPr algn="ctr"/>
-            <a:endParaRPr lang="en-SG">
-              <a:solidFill>
-                <a:schemeClr val="tx1"/>
-              </a:solidFill>
-            </a:endParaRPr>
-          </a:p>
-        </p:txBody>
-      </p:sp>
-      <p:sp>
-        <p:nvSpPr>
-          <p:cNvPr id="133" name="TextBox 132">
-            <a:extLst>
-              <a:ext uri="{FF2B5EF4-FFF2-40B4-BE49-F238E27FC236}">
-                <a16:creationId xmlns:a16="http://schemas.microsoft.com/office/drawing/2014/main" id="{83976675-DF65-4C6C-9E4F-037003405C78}"/>
-              </a:ext>
-            </a:extLst>
-          </p:cNvPr>
-          <p:cNvSpPr txBox="1"/>
-          <p:nvPr/>
-        </p:nvSpPr>
-        <p:spPr>
-          <a:xfrm>
-            <a:off x="5462170" y="3208028"/>
-            <a:ext cx="1462768" cy="215444"/>
-          </a:xfrm>
-          <a:prstGeom prst="rect">
-            <a:avLst/>
-          </a:prstGeom>
-          <a:noFill/>
-        </p:spPr>
-        <p:txBody>
-          <a:bodyPr wrap="square" rtlCol="0">
-            <a:spAutoFit/>
-          </a:bodyPr>
-          <a:lstStyle/>
-          <a:p>
-            <a:r>
-              <a:rPr lang="en-SG" sz="800" dirty="0"/>
-              <a:t>person.add(appointment)</a:t>
-            </a:r>
-          </a:p>
-        </p:txBody>
-      </p:sp>
-      <p:sp>
-        <p:nvSpPr>
-          <p:cNvPr id="135" name="TextBox 134">
-            <a:extLst>
-              <a:ext uri="{FF2B5EF4-FFF2-40B4-BE49-F238E27FC236}">
-                <a16:creationId xmlns:a16="http://schemas.microsoft.com/office/drawing/2014/main" id="{F77354D3-05EC-43C9-96AE-7A433CA0AAF9}"/>
-              </a:ext>
-            </a:extLst>
-          </p:cNvPr>
-          <p:cNvSpPr txBox="1"/>
-          <p:nvPr/>
-        </p:nvSpPr>
-        <p:spPr>
-          <a:xfrm>
-            <a:off x="745301" y="178296"/>
-            <a:ext cx="1003519" cy="369332"/>
-          </a:xfrm>
-          <a:prstGeom prst="rect">
-            <a:avLst/>
-          </a:prstGeom>
-          <a:noFill/>
-        </p:spPr>
-        <p:txBody>
-          <a:bodyPr wrap="square" rtlCol="0">
-            <a:spAutoFit/>
-          </a:bodyPr>
-          <a:lstStyle/>
-          <a:p>
-            <a:r>
-              <a:rPr lang="en-SG" dirty="0"/>
-              <a:t>Model</a:t>
-            </a:r>
-          </a:p>
-        </p:txBody>
-      </p:sp>
-      <p:sp>
-        <p:nvSpPr>
-          <p:cNvPr id="136" name="TextBox 135">
-            <a:extLst>
-              <a:ext uri="{FF2B5EF4-FFF2-40B4-BE49-F238E27FC236}">
-                <a16:creationId xmlns:a16="http://schemas.microsoft.com/office/drawing/2014/main" id="{E3A9A66D-B3B9-4942-BFB8-46072EA7A8EB}"/>
-              </a:ext>
-            </a:extLst>
-          </p:cNvPr>
-          <p:cNvSpPr txBox="1"/>
-          <p:nvPr/>
-        </p:nvSpPr>
-        <p:spPr>
-          <a:xfrm>
-            <a:off x="8172159" y="307854"/>
-            <a:ext cx="1061357" cy="375558"/>
-          </a:xfrm>
-          <a:prstGeom prst="rect">
-            <a:avLst/>
-          </a:prstGeom>
-          <a:noFill/>
-        </p:spPr>
-        <p:txBody>
-          <a:bodyPr wrap="square" rtlCol="0">
-            <a:spAutoFit/>
-          </a:bodyPr>
-          <a:lstStyle/>
-          <a:p>
-            <a:r>
-              <a:rPr lang="en-SG" dirty="0"/>
-              <a:t>UI</a:t>
-            </a:r>
-          </a:p>
-        </p:txBody>
-      </p:sp>
-      <p:sp>
-        <p:nvSpPr>
-          <p:cNvPr id="137" name="Rectangle 136">
-            <a:extLst>
-              <a:ext uri="{FF2B5EF4-FFF2-40B4-BE49-F238E27FC236}">
-                <a16:creationId xmlns:a16="http://schemas.microsoft.com/office/drawing/2014/main" id="{FFF3D27F-2508-491F-8940-A3E0B25D3D83}"/>
-              </a:ext>
-            </a:extLst>
-          </p:cNvPr>
-          <p:cNvSpPr/>
-          <p:nvPr/>
-        </p:nvSpPr>
-        <p:spPr>
-          <a:xfrm>
-            <a:off x="8644075" y="446511"/>
-            <a:ext cx="2095900" cy="473802"/>
+            <a:off x="4278097" y="1684359"/>
+            <a:ext cx="111780" cy="1133085"/>
           </a:xfrm>
           <a:prstGeom prst="rect">
             <a:avLst/>
           </a:prstGeom>
           <a:solidFill>
-            <a:srgbClr val="FF0000"/>
-          </a:solidFill>
-          <a:ln w="19050">
-            <a:solidFill>
-              <a:schemeClr val="tx1"/>
-            </a:solidFill>
-          </a:ln>
-          <a:effectLst/>
-        </p:spPr>
-        <p:style>
-          <a:lnRef idx="1">
-            <a:schemeClr val="accent2"/>
-          </a:lnRef>
-          <a:fillRef idx="2">
-            <a:schemeClr val="accent2"/>
-          </a:fillRef>
-          <a:effectRef idx="1">
-            <a:schemeClr val="accent2"/>
-          </a:effectRef>
-          <a:fontRef idx="minor">
-            <a:schemeClr val="dk1"/>
-          </a:fontRef>
-        </p:style>
-        <p:txBody>
-          <a:bodyPr rtlCol="0" anchor="ctr"/>
-          <a:lstStyle>
-            <a:defPPr>
-              <a:defRPr lang="en-US"/>
-            </a:defPPr>
-            <a:lvl1pPr marL="0" algn="l" defTabSz="914400" rtl="0" eaLnBrk="1" latinLnBrk="0" hangingPunct="1">
-              <a:defRPr sz="1800" kern="1200">
-                <a:solidFill>
-                  <a:schemeClr val="dk1"/>
-                </a:solidFill>
-                <a:latin typeface="+mn-lt"/>
-                <a:ea typeface="+mn-ea"/>
-                <a:cs typeface="+mn-cs"/>
-              </a:defRPr>
-            </a:lvl1pPr>
-            <a:lvl2pPr marL="457200" algn="l" defTabSz="914400" rtl="0" eaLnBrk="1" latinLnBrk="0" hangingPunct="1">
-              <a:defRPr sz="1800" kern="1200">
-                <a:solidFill>
-                  <a:schemeClr val="dk1"/>
-                </a:solidFill>
-                <a:latin typeface="+mn-lt"/>
-                <a:ea typeface="+mn-ea"/>
-                <a:cs typeface="+mn-cs"/>
-              </a:defRPr>
-            </a:lvl2pPr>
-            <a:lvl3pPr marL="914400" algn="l" defTabSz="914400" rtl="0" eaLnBrk="1" latinLnBrk="0" hangingPunct="1">
-              <a:defRPr sz="1800" kern="1200">
-                <a:solidFill>
-                  <a:schemeClr val="dk1"/>
-                </a:solidFill>
-                <a:latin typeface="+mn-lt"/>
-                <a:ea typeface="+mn-ea"/>
-                <a:cs typeface="+mn-cs"/>
-              </a:defRPr>
-            </a:lvl3pPr>
-            <a:lvl4pPr marL="1371600" algn="l" defTabSz="914400" rtl="0" eaLnBrk="1" latinLnBrk="0" hangingPunct="1">
-              <a:defRPr sz="1800" kern="1200">
-                <a:solidFill>
-                  <a:schemeClr val="dk1"/>
-                </a:solidFill>
-                <a:latin typeface="+mn-lt"/>
-                <a:ea typeface="+mn-ea"/>
-                <a:cs typeface="+mn-cs"/>
-              </a:defRPr>
-            </a:lvl4pPr>
-            <a:lvl5pPr marL="1828800" algn="l" defTabSz="914400" rtl="0" eaLnBrk="1" latinLnBrk="0" hangingPunct="1">
-              <a:defRPr sz="1800" kern="1200">
-                <a:solidFill>
-                  <a:schemeClr val="dk1"/>
-                </a:solidFill>
-                <a:latin typeface="+mn-lt"/>
-                <a:ea typeface="+mn-ea"/>
-                <a:cs typeface="+mn-cs"/>
-              </a:defRPr>
-            </a:lvl5pPr>
-            <a:lvl6pPr marL="2286000" algn="l" defTabSz="914400" rtl="0" eaLnBrk="1" latinLnBrk="0" hangingPunct="1">
-              <a:defRPr sz="1800" kern="1200">
-                <a:solidFill>
-                  <a:schemeClr val="dk1"/>
-                </a:solidFill>
-                <a:latin typeface="+mn-lt"/>
-                <a:ea typeface="+mn-ea"/>
-                <a:cs typeface="+mn-cs"/>
-              </a:defRPr>
-            </a:lvl6pPr>
-            <a:lvl7pPr marL="2743200" algn="l" defTabSz="914400" rtl="0" eaLnBrk="1" latinLnBrk="0" hangingPunct="1">
-              <a:defRPr sz="1800" kern="1200">
-                <a:solidFill>
-                  <a:schemeClr val="dk1"/>
-                </a:solidFill>
-                <a:latin typeface="+mn-lt"/>
-                <a:ea typeface="+mn-ea"/>
-                <a:cs typeface="+mn-cs"/>
-              </a:defRPr>
-            </a:lvl7pPr>
-            <a:lvl8pPr marL="3200400" algn="l" defTabSz="914400" rtl="0" eaLnBrk="1" latinLnBrk="0" hangingPunct="1">
-              <a:defRPr sz="1800" kern="1200">
-                <a:solidFill>
-                  <a:schemeClr val="dk1"/>
-                </a:solidFill>
-                <a:latin typeface="+mn-lt"/>
-                <a:ea typeface="+mn-ea"/>
-                <a:cs typeface="+mn-cs"/>
-              </a:defRPr>
-            </a:lvl8pPr>
-            <a:lvl9pPr marL="3657600" algn="l" defTabSz="914400" rtl="0" eaLnBrk="1" latinLnBrk="0" hangingPunct="1">
-              <a:defRPr sz="1800" kern="1200">
-                <a:solidFill>
-                  <a:schemeClr val="dk1"/>
-                </a:solidFill>
-                <a:latin typeface="+mn-lt"/>
-                <a:ea typeface="+mn-ea"/>
-                <a:cs typeface="+mn-cs"/>
-              </a:defRPr>
-            </a:lvl9pPr>
-          </a:lstStyle>
-          <a:p>
-            <a:pPr algn="ctr"/>
-            <a:r>
-              <a:rPr lang="en-US" sz="1600" dirty="0">
-                <a:solidFill>
-                  <a:schemeClr val="bg1"/>
-                </a:solidFill>
-              </a:rPr>
-              <a:t>:</a:t>
-            </a:r>
-            <a:r>
-              <a:rPr lang="en-US" sz="1600" dirty="0" err="1">
-                <a:solidFill>
-                  <a:schemeClr val="bg1"/>
-                </a:solidFill>
-              </a:rPr>
-              <a:t>CalendarView</a:t>
-            </a:r>
-            <a:endParaRPr lang="en-SG" sz="1600" dirty="0">
-              <a:solidFill>
-                <a:schemeClr val="bg1"/>
-              </a:solidFill>
-            </a:endParaRPr>
-          </a:p>
-        </p:txBody>
-      </p:sp>
-      <p:cxnSp>
-        <p:nvCxnSpPr>
-          <p:cNvPr id="138" name="Straight Connector 137">
-            <a:extLst>
-              <a:ext uri="{FF2B5EF4-FFF2-40B4-BE49-F238E27FC236}">
-                <a16:creationId xmlns:a16="http://schemas.microsoft.com/office/drawing/2014/main" id="{3388C16F-87E0-45AF-A6E2-ACD7CCD9BBD2}"/>
-              </a:ext>
-            </a:extLst>
-          </p:cNvPr>
-          <p:cNvCxnSpPr>
-            <a:cxnSpLocks/>
-          </p:cNvCxnSpPr>
-          <p:nvPr/>
-        </p:nvCxnSpPr>
-        <p:spPr>
-          <a:xfrm>
-            <a:off x="9605859" y="940844"/>
-            <a:ext cx="0" cy="5783592"/>
-          </a:xfrm>
-          <a:prstGeom prst="line">
-            <a:avLst/>
-          </a:prstGeom>
-          <a:ln w="19050">
-            <a:solidFill>
-              <a:schemeClr val="tx1"/>
-            </a:solidFill>
-            <a:prstDash val="sysDash"/>
-          </a:ln>
-          <a:effectLst/>
-        </p:spPr>
-        <p:style>
-          <a:lnRef idx="1">
-            <a:schemeClr val="accent1"/>
-          </a:lnRef>
-          <a:fillRef idx="2">
-            <a:schemeClr val="accent1"/>
-          </a:fillRef>
-          <a:effectRef idx="1">
-            <a:schemeClr val="accent1"/>
-          </a:effectRef>
-          <a:fontRef idx="minor">
-            <a:schemeClr val="dk1"/>
-          </a:fontRef>
-        </p:style>
-      </p:cxnSp>
-      <p:sp>
-        <p:nvSpPr>
-          <p:cNvPr id="139" name="Rectangle 138">
-            <a:extLst>
-              <a:ext uri="{FF2B5EF4-FFF2-40B4-BE49-F238E27FC236}">
-                <a16:creationId xmlns:a16="http://schemas.microsoft.com/office/drawing/2014/main" id="{C04EA739-CD99-46C7-BE9A-A3DA2AF11616}"/>
-              </a:ext>
-            </a:extLst>
-          </p:cNvPr>
-          <p:cNvSpPr/>
-          <p:nvPr/>
-        </p:nvSpPr>
-        <p:spPr>
-          <a:xfrm>
-            <a:off x="9522308" y="1262963"/>
-            <a:ext cx="192482" cy="4819337"/>
-          </a:xfrm>
-          <a:prstGeom prst="rect">
-            <a:avLst/>
-          </a:prstGeom>
-          <a:solidFill>
-            <a:srgbClr val="FF0000"/>
+            <a:srgbClr val="F8CECC"/>
           </a:solidFill>
           <a:ln>
             <a:solidFill>
@@ -5523,12 +4411,56 @@
           </a:p>
         </p:txBody>
       </p:sp>
-      <p:sp>
-        <p:nvSpPr>
-          <p:cNvPr id="145" name="Rectangle: Single Corner Snipped 144">
-            <a:extLst>
-              <a:ext uri="{FF2B5EF4-FFF2-40B4-BE49-F238E27FC236}">
-                <a16:creationId xmlns:a16="http://schemas.microsoft.com/office/drawing/2014/main" id="{44921E1E-328F-4FEA-9DF7-88DB8A272C36}"/>
+      <p:cxnSp>
+        <p:nvCxnSpPr>
+          <p:cNvPr id="86" name="Straight Arrow Connector 85">
+            <a:extLst>
+              <a:ext uri="{FF2B5EF4-FFF2-40B4-BE49-F238E27FC236}">
+                <a16:creationId xmlns:a16="http://schemas.microsoft.com/office/drawing/2014/main" id="{863EC290-BE4D-4763-8F9C-D0C97DD01670}"/>
+              </a:ext>
+            </a:extLst>
+          </p:cNvPr>
+          <p:cNvCxnSpPr>
+            <a:cxnSpLocks/>
+          </p:cNvCxnSpPr>
+          <p:nvPr/>
+        </p:nvCxnSpPr>
+        <p:spPr>
+          <a:xfrm>
+            <a:off x="4552321" y="1977666"/>
+            <a:ext cx="3630429" cy="0"/>
+          </a:xfrm>
+          <a:prstGeom prst="straightConnector1">
+            <a:avLst/>
+          </a:prstGeom>
+          <a:ln w="19050">
+            <a:solidFill>
+              <a:schemeClr val="tx1"/>
+            </a:solidFill>
+            <a:tailEnd type="arrow"/>
+          </a:ln>
+        </p:spPr>
+        <p:style>
+          <a:lnRef idx="1">
+            <a:schemeClr val="accent1"/>
+          </a:lnRef>
+          <a:fillRef idx="0">
+            <a:schemeClr val="accent1"/>
+          </a:fillRef>
+          <a:effectRef idx="0">
+            <a:schemeClr val="accent1"/>
+          </a:effectRef>
+          <a:fontRef idx="minor">
+            <a:schemeClr val="tx1"/>
+          </a:fontRef>
+        </p:style>
+      </p:cxnSp>
+      <p:sp>
+        <p:nvSpPr>
+          <p:cNvPr id="90" name="Rectangle: Rounded Corners 89">
+            <a:extLst>
+              <a:ext uri="{FF2B5EF4-FFF2-40B4-BE49-F238E27FC236}">
+                <a16:creationId xmlns:a16="http://schemas.microsoft.com/office/drawing/2014/main" id="{27B9D887-AC62-4EC7-8406-D9520FF61B58}"/>
               </a:ext>
             </a:extLst>
           </p:cNvPr>
@@ -5537,13 +4469,15 @@
         </p:nvSpPr>
         <p:spPr>
           <a:xfrm>
-            <a:off x="8369410" y="3175432"/>
-            <a:ext cx="968364" cy="314538"/>
-          </a:xfrm>
-          <a:prstGeom prst="snip1Rect">
+            <a:off x="10806209" y="1830410"/>
+            <a:ext cx="1341689" cy="440352"/>
+          </a:xfrm>
+          <a:prstGeom prst="roundRect">
             <a:avLst/>
           </a:prstGeom>
-          <a:noFill/>
+          <a:solidFill>
+            <a:srgbClr val="F8CECC"/>
+          </a:solidFill>
         </p:spPr>
         <p:style>
           <a:lnRef idx="2">
@@ -5566,16 +4500,23 @@
           <a:lstStyle/>
           <a:p>
             <a:pPr algn="ctr"/>
-            <a:endParaRPr lang="en-SG"/>
-          </a:p>
-        </p:txBody>
-      </p:sp>
-      <p:sp>
-        <p:nvSpPr>
-          <p:cNvPr id="146" name="TextBox 145">
-            <a:extLst>
-              <a:ext uri="{FF2B5EF4-FFF2-40B4-BE49-F238E27FC236}">
-                <a16:creationId xmlns:a16="http://schemas.microsoft.com/office/drawing/2014/main" id="{12182670-45BB-4FAE-BE00-5EE570BC522E}"/>
+            <a:r>
+              <a:rPr lang="en-SG" sz="1000" dirty="0">
+                <a:solidFill>
+                  <a:schemeClr val="tx1"/>
+                </a:solidFill>
+              </a:rPr>
+              <a:t>:List&lt;Appointment&gt;</a:t>
+            </a:r>
+          </a:p>
+        </p:txBody>
+      </p:sp>
+      <p:sp>
+        <p:nvSpPr>
+          <p:cNvPr id="96" name="TextBox 95">
+            <a:extLst>
+              <a:ext uri="{FF2B5EF4-FFF2-40B4-BE49-F238E27FC236}">
+                <a16:creationId xmlns:a16="http://schemas.microsoft.com/office/drawing/2014/main" id="{C91CF039-F7A6-4055-8FB2-D3B09D6EA423}"/>
               </a:ext>
             </a:extLst>
           </p:cNvPr>
@@ -5584,8 +4525,8 @@
         </p:nvSpPr>
         <p:spPr>
           <a:xfrm>
-            <a:off x="8504829" y="3192874"/>
-            <a:ext cx="975704" cy="553998"/>
+            <a:off x="4548209" y="1678688"/>
+            <a:ext cx="2210035" cy="276999"/>
           </a:xfrm>
           <a:prstGeom prst="rect">
             <a:avLst/>
@@ -5599,27 +4540,18 @@
           <a:lstStyle/>
           <a:p>
             <a:r>
-              <a:rPr lang="en-SG" sz="1000" dirty="0"/>
-              <a:t>Loop</a:t>
-            </a:r>
-          </a:p>
-          <a:p>
-            <a:endParaRPr lang="en-SG" sz="1000" dirty="0"/>
-          </a:p>
-          <a:p>
-            <a:r>
-              <a:rPr lang="en-SG" sz="1000" dirty="0"/>
-              <a:t>[every second]</a:t>
-            </a:r>
-          </a:p>
-        </p:txBody>
-      </p:sp>
-      <p:sp>
-        <p:nvSpPr>
-          <p:cNvPr id="147" name="Arrow: Curved Left 146">
-            <a:extLst>
-              <a:ext uri="{FF2B5EF4-FFF2-40B4-BE49-F238E27FC236}">
-                <a16:creationId xmlns:a16="http://schemas.microsoft.com/office/drawing/2014/main" id="{9922835B-EE60-4E68-84ED-9AF05A864C39}"/>
+              <a:rPr lang="en-SG" sz="1200" dirty="0"/>
+              <a:t>toList()</a:t>
+            </a:r>
+          </a:p>
+        </p:txBody>
+      </p:sp>
+      <p:sp>
+        <p:nvSpPr>
+          <p:cNvPr id="98" name="Rectangle: Rounded Corners 97">
+            <a:extLst>
+              <a:ext uri="{FF2B5EF4-FFF2-40B4-BE49-F238E27FC236}">
+                <a16:creationId xmlns:a16="http://schemas.microsoft.com/office/drawing/2014/main" id="{F0279EB2-2E72-4E00-BA6B-0CDBBB349E13}"/>
               </a:ext>
             </a:extLst>
           </p:cNvPr>
@@ -5628,12 +4560,15 @@
         </p:nvSpPr>
         <p:spPr>
           <a:xfrm>
-            <a:off x="9735475" y="4427498"/>
-            <a:ext cx="155846" cy="938160"/>
-          </a:xfrm>
-          <a:prstGeom prst="curvedLeftArrow">
+            <a:off x="7255327" y="672756"/>
+            <a:ext cx="2080517" cy="582997"/>
+          </a:xfrm>
+          <a:prstGeom prst="roundRect">
             <a:avLst/>
           </a:prstGeom>
+          <a:solidFill>
+            <a:srgbClr val="F8CECC"/>
+          </a:solidFill>
         </p:spPr>
         <p:style>
           <a:lnRef idx="2">
@@ -5656,55 +4591,174 @@
           <a:lstStyle/>
           <a:p>
             <a:pPr algn="ctr"/>
-            <a:endParaRPr lang="en-SG">
-              <a:solidFill>
-                <a:schemeClr val="tx1"/>
-              </a:solidFill>
-            </a:endParaRPr>
-          </a:p>
-        </p:txBody>
-      </p:sp>
-      <p:sp>
-        <p:nvSpPr>
-          <p:cNvPr id="149" name="TextBox 148">
-            <a:extLst>
-              <a:ext uri="{FF2B5EF4-FFF2-40B4-BE49-F238E27FC236}">
-                <a16:creationId xmlns:a16="http://schemas.microsoft.com/office/drawing/2014/main" id="{8C259B1F-011B-492F-A920-1C23D3C40935}"/>
-              </a:ext>
-            </a:extLst>
-          </p:cNvPr>
-          <p:cNvSpPr txBox="1"/>
+            <a:r>
+              <a:rPr lang="en-SG" dirty="0">
+                <a:solidFill>
+                  <a:schemeClr val="tx1"/>
+                </a:solidFill>
+              </a:rPr>
+              <a:t>AppointmentList</a:t>
+            </a:r>
+          </a:p>
+        </p:txBody>
+      </p:sp>
+      <p:sp>
+        <p:nvSpPr>
+          <p:cNvPr id="100" name="Rectangle 99">
+            <a:extLst>
+              <a:ext uri="{FF2B5EF4-FFF2-40B4-BE49-F238E27FC236}">
+                <a16:creationId xmlns:a16="http://schemas.microsoft.com/office/drawing/2014/main" id="{782347B8-4E70-483C-9B9D-C06BA4F24527}"/>
+              </a:ext>
+            </a:extLst>
+          </p:cNvPr>
+          <p:cNvSpPr/>
           <p:nvPr/>
         </p:nvSpPr>
         <p:spPr>
           <a:xfrm>
-            <a:off x="9912006" y="4766502"/>
-            <a:ext cx="1462768" cy="215444"/>
+            <a:off x="8231636" y="1894106"/>
+            <a:ext cx="127900" cy="895437"/>
           </a:xfrm>
           <a:prstGeom prst="rect">
             <a:avLst/>
           </a:prstGeom>
-          <a:noFill/>
-        </p:spPr>
-        <p:txBody>
-          <a:bodyPr wrap="square" rtlCol="0">
-            <a:spAutoFit/>
-          </a:bodyPr>
-          <a:lstStyle/>
-          <a:p>
-            <a:r>
-              <a:rPr lang="en-SG" sz="800" dirty="0"/>
-              <a:t>setAppointment()</a:t>
-            </a:r>
+          <a:solidFill>
+            <a:srgbClr val="F8CECC"/>
+          </a:solidFill>
+          <a:ln>
+            <a:solidFill>
+              <a:schemeClr val="tx1"/>
+            </a:solidFill>
+          </a:ln>
+          <a:effectLst/>
+        </p:spPr>
+        <p:style>
+          <a:lnRef idx="1">
+            <a:schemeClr val="accent3"/>
+          </a:lnRef>
+          <a:fillRef idx="2">
+            <a:schemeClr val="accent3"/>
+          </a:fillRef>
+          <a:effectRef idx="1">
+            <a:schemeClr val="accent3"/>
+          </a:effectRef>
+          <a:fontRef idx="minor">
+            <a:schemeClr val="dk1"/>
+          </a:fontRef>
+        </p:style>
+        <p:txBody>
+          <a:bodyPr rtlCol="0" anchor="ctr"/>
+          <a:lstStyle>
+            <a:defPPr>
+              <a:defRPr lang="en-US"/>
+            </a:defPPr>
+            <a:lvl1pPr marL="0" algn="l" defTabSz="914400" rtl="0" eaLnBrk="1" latinLnBrk="0" hangingPunct="1">
+              <a:defRPr sz="1800" kern="1200">
+                <a:solidFill>
+                  <a:schemeClr val="dk1"/>
+                </a:solidFill>
+                <a:latin typeface="+mn-lt"/>
+                <a:ea typeface="+mn-ea"/>
+                <a:cs typeface="+mn-cs"/>
+              </a:defRPr>
+            </a:lvl1pPr>
+            <a:lvl2pPr marL="457200" algn="l" defTabSz="914400" rtl="0" eaLnBrk="1" latinLnBrk="0" hangingPunct="1">
+              <a:defRPr sz="1800" kern="1200">
+                <a:solidFill>
+                  <a:schemeClr val="dk1"/>
+                </a:solidFill>
+                <a:latin typeface="+mn-lt"/>
+                <a:ea typeface="+mn-ea"/>
+                <a:cs typeface="+mn-cs"/>
+              </a:defRPr>
+            </a:lvl2pPr>
+            <a:lvl3pPr marL="914400" algn="l" defTabSz="914400" rtl="0" eaLnBrk="1" latinLnBrk="0" hangingPunct="1">
+              <a:defRPr sz="1800" kern="1200">
+                <a:solidFill>
+                  <a:schemeClr val="dk1"/>
+                </a:solidFill>
+                <a:latin typeface="+mn-lt"/>
+                <a:ea typeface="+mn-ea"/>
+                <a:cs typeface="+mn-cs"/>
+              </a:defRPr>
+            </a:lvl3pPr>
+            <a:lvl4pPr marL="1371600" algn="l" defTabSz="914400" rtl="0" eaLnBrk="1" latinLnBrk="0" hangingPunct="1">
+              <a:defRPr sz="1800" kern="1200">
+                <a:solidFill>
+                  <a:schemeClr val="dk1"/>
+                </a:solidFill>
+                <a:latin typeface="+mn-lt"/>
+                <a:ea typeface="+mn-ea"/>
+                <a:cs typeface="+mn-cs"/>
+              </a:defRPr>
+            </a:lvl4pPr>
+            <a:lvl5pPr marL="1828800" algn="l" defTabSz="914400" rtl="0" eaLnBrk="1" latinLnBrk="0" hangingPunct="1">
+              <a:defRPr sz="1800" kern="1200">
+                <a:solidFill>
+                  <a:schemeClr val="dk1"/>
+                </a:solidFill>
+                <a:latin typeface="+mn-lt"/>
+                <a:ea typeface="+mn-ea"/>
+                <a:cs typeface="+mn-cs"/>
+              </a:defRPr>
+            </a:lvl5pPr>
+            <a:lvl6pPr marL="2286000" algn="l" defTabSz="914400" rtl="0" eaLnBrk="1" latinLnBrk="0" hangingPunct="1">
+              <a:defRPr sz="1800" kern="1200">
+                <a:solidFill>
+                  <a:schemeClr val="dk1"/>
+                </a:solidFill>
+                <a:latin typeface="+mn-lt"/>
+                <a:ea typeface="+mn-ea"/>
+                <a:cs typeface="+mn-cs"/>
+              </a:defRPr>
+            </a:lvl6pPr>
+            <a:lvl7pPr marL="2743200" algn="l" defTabSz="914400" rtl="0" eaLnBrk="1" latinLnBrk="0" hangingPunct="1">
+              <a:defRPr sz="1800" kern="1200">
+                <a:solidFill>
+                  <a:schemeClr val="dk1"/>
+                </a:solidFill>
+                <a:latin typeface="+mn-lt"/>
+                <a:ea typeface="+mn-ea"/>
+                <a:cs typeface="+mn-cs"/>
+              </a:defRPr>
+            </a:lvl7pPr>
+            <a:lvl8pPr marL="3200400" algn="l" defTabSz="914400" rtl="0" eaLnBrk="1" latinLnBrk="0" hangingPunct="1">
+              <a:defRPr sz="1800" kern="1200">
+                <a:solidFill>
+                  <a:schemeClr val="dk1"/>
+                </a:solidFill>
+                <a:latin typeface="+mn-lt"/>
+                <a:ea typeface="+mn-ea"/>
+                <a:cs typeface="+mn-cs"/>
+              </a:defRPr>
+            </a:lvl8pPr>
+            <a:lvl9pPr marL="3657600" algn="l" defTabSz="914400" rtl="0" eaLnBrk="1" latinLnBrk="0" hangingPunct="1">
+              <a:defRPr sz="1800" kern="1200">
+                <a:solidFill>
+                  <a:schemeClr val="dk1"/>
+                </a:solidFill>
+                <a:latin typeface="+mn-lt"/>
+                <a:ea typeface="+mn-ea"/>
+                <a:cs typeface="+mn-cs"/>
+              </a:defRPr>
+            </a:lvl9pPr>
+          </a:lstStyle>
+          <a:p>
+            <a:pPr algn="ctr"/>
+            <a:endParaRPr lang="en-SG" sz="1400">
+              <a:solidFill>
+                <a:schemeClr val="bg1"/>
+              </a:solidFill>
+            </a:endParaRPr>
           </a:p>
         </p:txBody>
       </p:sp>
       <p:cxnSp>
         <p:nvCxnSpPr>
-          <p:cNvPr id="39" name="Straight Arrow Connector 38">
-            <a:extLst>
-              <a:ext uri="{FF2B5EF4-FFF2-40B4-BE49-F238E27FC236}">
-                <a16:creationId xmlns:a16="http://schemas.microsoft.com/office/drawing/2014/main" id="{9EC5A4F2-10D5-4112-93D3-9F8A629D4ECD}"/>
+          <p:cNvPr id="101" name="Straight Arrow Connector 100">
+            <a:extLst>
+              <a:ext uri="{FF2B5EF4-FFF2-40B4-BE49-F238E27FC236}">
+                <a16:creationId xmlns:a16="http://schemas.microsoft.com/office/drawing/2014/main" id="{80FD0E98-5BCB-4F33-B9F1-0FB755B94C56}"/>
               </a:ext>
             </a:extLst>
           </p:cNvPr>
@@ -5714,16 +4768,98 @@
           <p:nvPr/>
         </p:nvCxnSpPr>
         <p:spPr>
-          <a:xfrm flipH="1">
-            <a:off x="2201513" y="5774075"/>
-            <a:ext cx="1329240" cy="0"/>
+          <a:xfrm>
+            <a:off x="8389755" y="2153095"/>
+            <a:ext cx="2434976" cy="0"/>
           </a:xfrm>
           <a:prstGeom prst="straightConnector1">
             <a:avLst/>
           </a:prstGeom>
           <a:ln w="19050">
-            <a:prstDash val="sysDash"/>
-            <a:tailEnd type="triangle"/>
+            <a:solidFill>
+              <a:schemeClr val="tx1"/>
+            </a:solidFill>
+            <a:tailEnd type="arrow"/>
+          </a:ln>
+        </p:spPr>
+        <p:style>
+          <a:lnRef idx="1">
+            <a:schemeClr val="accent1"/>
+          </a:lnRef>
+          <a:fillRef idx="0">
+            <a:schemeClr val="accent1"/>
+          </a:fillRef>
+          <a:effectRef idx="0">
+            <a:schemeClr val="accent1"/>
+          </a:effectRef>
+          <a:fontRef idx="minor">
+            <a:schemeClr val="tx1"/>
+          </a:fontRef>
+        </p:style>
+      </p:cxnSp>
+      <p:sp>
+        <p:nvSpPr>
+          <p:cNvPr id="102" name="TextBox 101">
+            <a:extLst>
+              <a:ext uri="{FF2B5EF4-FFF2-40B4-BE49-F238E27FC236}">
+                <a16:creationId xmlns:a16="http://schemas.microsoft.com/office/drawing/2014/main" id="{3A9E120C-66AD-4E13-AFE5-DDD2206E4DED}"/>
+              </a:ext>
+            </a:extLst>
+          </p:cNvPr>
+          <p:cNvSpPr txBox="1"/>
+          <p:nvPr/>
+        </p:nvSpPr>
+        <p:spPr>
+          <a:xfrm>
+            <a:off x="8401739" y="1867192"/>
+            <a:ext cx="2210035" cy="276999"/>
+          </a:xfrm>
+          <a:prstGeom prst="rect">
+            <a:avLst/>
+          </a:prstGeom>
+          <a:noFill/>
+        </p:spPr>
+        <p:txBody>
+          <a:bodyPr wrap="square" rtlCol="0">
+            <a:spAutoFit/>
+          </a:bodyPr>
+          <a:lstStyle/>
+          <a:p>
+            <a:r>
+              <a:rPr lang="en-SG" sz="1200" dirty="0"/>
+              <a:t>List&lt;Appointment&gt;(internalList)</a:t>
+            </a:r>
+          </a:p>
+        </p:txBody>
+      </p:sp>
+      <p:cxnSp>
+        <p:nvCxnSpPr>
+          <p:cNvPr id="103" name="Straight Arrow Connector 102">
+            <a:extLst>
+              <a:ext uri="{FF2B5EF4-FFF2-40B4-BE49-F238E27FC236}">
+                <a16:creationId xmlns:a16="http://schemas.microsoft.com/office/drawing/2014/main" id="{8CA69D06-1995-4E90-BD29-21EA2352BE1B}"/>
+              </a:ext>
+            </a:extLst>
+          </p:cNvPr>
+          <p:cNvCxnSpPr>
+            <a:cxnSpLocks/>
+          </p:cNvCxnSpPr>
+          <p:nvPr/>
+        </p:nvCxnSpPr>
+        <p:spPr>
+          <a:xfrm flipH="1" flipV="1">
+            <a:off x="8423486" y="2535371"/>
+            <a:ext cx="2920448" cy="27022"/>
+          </a:xfrm>
+          <a:prstGeom prst="straightConnector1">
+            <a:avLst/>
+          </a:prstGeom>
+          <a:ln w="19050">
+            <a:solidFill>
+              <a:schemeClr val="tx1"/>
+            </a:solidFill>
+            <a:prstDash val="dash"/>
+            <a:tailEnd type="arrow"/>
           </a:ln>
         </p:spPr>
         <p:style>
@@ -5743,10 +4879,10 @@
       </p:cxnSp>
       <p:cxnSp>
         <p:nvCxnSpPr>
-          <p:cNvPr id="40" name="Straight Arrow Connector 39">
-            <a:extLst>
-              <a:ext uri="{FF2B5EF4-FFF2-40B4-BE49-F238E27FC236}">
-                <a16:creationId xmlns:a16="http://schemas.microsoft.com/office/drawing/2014/main" id="{F9840FF0-126B-4DD0-9B1C-87222C4DA902}"/>
+          <p:cNvPr id="106" name="Straight Arrow Connector 105">
+            <a:extLst>
+              <a:ext uri="{FF2B5EF4-FFF2-40B4-BE49-F238E27FC236}">
+                <a16:creationId xmlns:a16="http://schemas.microsoft.com/office/drawing/2014/main" id="{C5462F45-BE44-4C9D-ADEF-1EEC59E2A04E}"/>
               </a:ext>
             </a:extLst>
           </p:cNvPr>
@@ -5757,15 +4893,894 @@
         </p:nvCxnSpPr>
         <p:spPr>
           <a:xfrm flipH="1">
-            <a:off x="3952007" y="5495967"/>
-            <a:ext cx="1329240" cy="0"/>
+            <a:off x="4503091" y="2596400"/>
+            <a:ext cx="3679659" cy="0"/>
           </a:xfrm>
           <a:prstGeom prst="straightConnector1">
             <a:avLst/>
           </a:prstGeom>
           <a:ln w="19050">
-            <a:prstDash val="sysDash"/>
-            <a:tailEnd type="triangle"/>
+            <a:solidFill>
+              <a:schemeClr val="tx1"/>
+            </a:solidFill>
+            <a:prstDash val="dash"/>
+            <a:tailEnd type="arrow"/>
+          </a:ln>
+        </p:spPr>
+        <p:style>
+          <a:lnRef idx="1">
+            <a:schemeClr val="accent1"/>
+          </a:lnRef>
+          <a:fillRef idx="0">
+            <a:schemeClr val="accent1"/>
+          </a:fillRef>
+          <a:effectRef idx="0">
+            <a:schemeClr val="accent1"/>
+          </a:effectRef>
+          <a:fontRef idx="minor">
+            <a:schemeClr val="tx1"/>
+          </a:fontRef>
+        </p:style>
+      </p:cxnSp>
+      <p:sp>
+        <p:nvSpPr>
+          <p:cNvPr id="116" name="TextBox 115">
+            <a:extLst>
+              <a:ext uri="{FF2B5EF4-FFF2-40B4-BE49-F238E27FC236}">
+                <a16:creationId xmlns:a16="http://schemas.microsoft.com/office/drawing/2014/main" id="{553D311C-EB06-4A90-B0E8-0CC040F01FDF}"/>
+              </a:ext>
+            </a:extLst>
+          </p:cNvPr>
+          <p:cNvSpPr txBox="1"/>
+          <p:nvPr/>
+        </p:nvSpPr>
+        <p:spPr>
+          <a:xfrm>
+            <a:off x="6070441" y="2262734"/>
+            <a:ext cx="2210035" cy="276999"/>
+          </a:xfrm>
+          <a:prstGeom prst="rect">
+            <a:avLst/>
+          </a:prstGeom>
+          <a:noFill/>
+        </p:spPr>
+        <p:txBody>
+          <a:bodyPr wrap="square" rtlCol="0">
+            <a:spAutoFit/>
+          </a:bodyPr>
+          <a:lstStyle/>
+          <a:p>
+            <a:r>
+              <a:rPr lang="en-SG" sz="1200" dirty="0"/>
+              <a:t>copyOfInternalAppointmentList</a:t>
+            </a:r>
+          </a:p>
+        </p:txBody>
+      </p:sp>
+      <p:cxnSp>
+        <p:nvCxnSpPr>
+          <p:cNvPr id="117" name="Straight Arrow Connector 116">
+            <a:extLst>
+              <a:ext uri="{FF2B5EF4-FFF2-40B4-BE49-F238E27FC236}">
+                <a16:creationId xmlns:a16="http://schemas.microsoft.com/office/drawing/2014/main" id="{D9D387EE-4C83-4B57-82F4-3DF90CCD0B39}"/>
+              </a:ext>
+            </a:extLst>
+          </p:cNvPr>
+          <p:cNvCxnSpPr>
+            <a:cxnSpLocks/>
+          </p:cNvCxnSpPr>
+          <p:nvPr/>
+        </p:nvCxnSpPr>
+        <p:spPr>
+          <a:xfrm flipH="1">
+            <a:off x="2226857" y="2719878"/>
+            <a:ext cx="2002109" cy="6541"/>
+          </a:xfrm>
+          <a:prstGeom prst="straightConnector1">
+            <a:avLst/>
+          </a:prstGeom>
+          <a:ln w="19050">
+            <a:solidFill>
+              <a:schemeClr val="tx1"/>
+            </a:solidFill>
+            <a:prstDash val="dash"/>
+            <a:tailEnd type="arrow"/>
+          </a:ln>
+        </p:spPr>
+        <p:style>
+          <a:lnRef idx="1">
+            <a:schemeClr val="accent1"/>
+          </a:lnRef>
+          <a:fillRef idx="0">
+            <a:schemeClr val="accent1"/>
+          </a:fillRef>
+          <a:effectRef idx="0">
+            <a:schemeClr val="accent1"/>
+          </a:effectRef>
+          <a:fontRef idx="minor">
+            <a:schemeClr val="tx1"/>
+          </a:fontRef>
+        </p:style>
+      </p:cxnSp>
+      <p:sp>
+        <p:nvSpPr>
+          <p:cNvPr id="118" name="TextBox 117">
+            <a:extLst>
+              <a:ext uri="{FF2B5EF4-FFF2-40B4-BE49-F238E27FC236}">
+                <a16:creationId xmlns:a16="http://schemas.microsoft.com/office/drawing/2014/main" id="{5AA7C56A-A087-49CE-84C4-8EE3134861F1}"/>
+              </a:ext>
+            </a:extLst>
+          </p:cNvPr>
+          <p:cNvSpPr txBox="1"/>
+          <p:nvPr/>
+        </p:nvSpPr>
+        <p:spPr>
+          <a:xfrm>
+            <a:off x="2199301" y="2389794"/>
+            <a:ext cx="2210035" cy="276999"/>
+          </a:xfrm>
+          <a:prstGeom prst="rect">
+            <a:avLst/>
+          </a:prstGeom>
+          <a:noFill/>
+        </p:spPr>
+        <p:txBody>
+          <a:bodyPr wrap="square" rtlCol="0">
+            <a:spAutoFit/>
+          </a:bodyPr>
+          <a:lstStyle/>
+          <a:p>
+            <a:r>
+              <a:rPr lang="en-SG" sz="1200" dirty="0"/>
+              <a:t>copyOfInternalAppointmentList</a:t>
+            </a:r>
+          </a:p>
+        </p:txBody>
+      </p:sp>
+      <p:sp>
+        <p:nvSpPr>
+          <p:cNvPr id="119" name="TextBox 118">
+            <a:extLst>
+              <a:ext uri="{FF2B5EF4-FFF2-40B4-BE49-F238E27FC236}">
+                <a16:creationId xmlns:a16="http://schemas.microsoft.com/office/drawing/2014/main" id="{0D89B963-04DB-4938-9182-C057A256E855}"/>
+              </a:ext>
+            </a:extLst>
+          </p:cNvPr>
+          <p:cNvSpPr txBox="1"/>
+          <p:nvPr/>
+        </p:nvSpPr>
+        <p:spPr>
+          <a:xfrm>
+            <a:off x="9197849" y="2276976"/>
+            <a:ext cx="2210035" cy="276999"/>
+          </a:xfrm>
+          <a:prstGeom prst="rect">
+            <a:avLst/>
+          </a:prstGeom>
+          <a:noFill/>
+        </p:spPr>
+        <p:txBody>
+          <a:bodyPr wrap="square" rtlCol="0">
+            <a:spAutoFit/>
+          </a:bodyPr>
+          <a:lstStyle/>
+          <a:p>
+            <a:r>
+              <a:rPr lang="en-SG" sz="1200" dirty="0"/>
+              <a:t>copyOfInternalAppointmentList</a:t>
+            </a:r>
+          </a:p>
+        </p:txBody>
+      </p:sp>
+      <p:cxnSp>
+        <p:nvCxnSpPr>
+          <p:cNvPr id="120" name="Straight Arrow Connector 119">
+            <a:extLst>
+              <a:ext uri="{FF2B5EF4-FFF2-40B4-BE49-F238E27FC236}">
+                <a16:creationId xmlns:a16="http://schemas.microsoft.com/office/drawing/2014/main" id="{1A4E0395-D175-4B8B-B7EE-EC600727C7E6}"/>
+              </a:ext>
+            </a:extLst>
+          </p:cNvPr>
+          <p:cNvCxnSpPr>
+            <a:cxnSpLocks/>
+          </p:cNvCxnSpPr>
+          <p:nvPr/>
+        </p:nvCxnSpPr>
+        <p:spPr>
+          <a:xfrm flipV="1">
+            <a:off x="2207521" y="3422249"/>
+            <a:ext cx="9136413" cy="27023"/>
+          </a:xfrm>
+          <a:prstGeom prst="straightConnector1">
+            <a:avLst/>
+          </a:prstGeom>
+          <a:ln w="19050">
+            <a:solidFill>
+              <a:schemeClr val="tx1"/>
+            </a:solidFill>
+            <a:tailEnd type="arrow"/>
+          </a:ln>
+        </p:spPr>
+        <p:style>
+          <a:lnRef idx="1">
+            <a:schemeClr val="accent1"/>
+          </a:lnRef>
+          <a:fillRef idx="0">
+            <a:schemeClr val="accent1"/>
+          </a:fillRef>
+          <a:effectRef idx="0">
+            <a:schemeClr val="accent1"/>
+          </a:effectRef>
+          <a:fontRef idx="minor">
+            <a:schemeClr val="tx1"/>
+          </a:fontRef>
+        </p:style>
+      </p:cxnSp>
+      <p:sp>
+        <p:nvSpPr>
+          <p:cNvPr id="122" name="TextBox 121">
+            <a:extLst>
+              <a:ext uri="{FF2B5EF4-FFF2-40B4-BE49-F238E27FC236}">
+                <a16:creationId xmlns:a16="http://schemas.microsoft.com/office/drawing/2014/main" id="{515C3314-7BA2-48EF-9E70-D11D8EBBCDB5}"/>
+              </a:ext>
+            </a:extLst>
+          </p:cNvPr>
+          <p:cNvSpPr txBox="1"/>
+          <p:nvPr/>
+        </p:nvSpPr>
+        <p:spPr>
+          <a:xfrm>
+            <a:off x="2233237" y="3178485"/>
+            <a:ext cx="2210035" cy="276999"/>
+          </a:xfrm>
+          <a:prstGeom prst="rect">
+            <a:avLst/>
+          </a:prstGeom>
+          <a:noFill/>
+        </p:spPr>
+        <p:txBody>
+          <a:bodyPr wrap="square" rtlCol="0">
+            <a:spAutoFit/>
+          </a:bodyPr>
+          <a:lstStyle/>
+          <a:p>
+            <a:r>
+              <a:rPr lang="en-SG" sz="1200" dirty="0"/>
+              <a:t>add(appointment)</a:t>
+            </a:r>
+          </a:p>
+        </p:txBody>
+      </p:sp>
+      <p:sp>
+        <p:nvSpPr>
+          <p:cNvPr id="123" name="Rectangle 122">
+            <a:extLst>
+              <a:ext uri="{FF2B5EF4-FFF2-40B4-BE49-F238E27FC236}">
+                <a16:creationId xmlns:a16="http://schemas.microsoft.com/office/drawing/2014/main" id="{9337B3D0-A3B2-4DAE-A3C3-884B1D822903}"/>
+              </a:ext>
+            </a:extLst>
+          </p:cNvPr>
+          <p:cNvSpPr/>
+          <p:nvPr/>
+        </p:nvSpPr>
+        <p:spPr>
+          <a:xfrm>
+            <a:off x="11412331" y="3390490"/>
+            <a:ext cx="127904" cy="287759"/>
+          </a:xfrm>
+          <a:prstGeom prst="rect">
+            <a:avLst/>
+          </a:prstGeom>
+          <a:solidFill>
+            <a:srgbClr val="F8CECC"/>
+          </a:solidFill>
+          <a:ln>
+            <a:solidFill>
+              <a:schemeClr val="tx1"/>
+            </a:solidFill>
+          </a:ln>
+          <a:effectLst/>
+        </p:spPr>
+        <p:style>
+          <a:lnRef idx="1">
+            <a:schemeClr val="accent3"/>
+          </a:lnRef>
+          <a:fillRef idx="2">
+            <a:schemeClr val="accent3"/>
+          </a:fillRef>
+          <a:effectRef idx="1">
+            <a:schemeClr val="accent3"/>
+          </a:effectRef>
+          <a:fontRef idx="minor">
+            <a:schemeClr val="dk1"/>
+          </a:fontRef>
+        </p:style>
+        <p:txBody>
+          <a:bodyPr rtlCol="0" anchor="ctr"/>
+          <a:lstStyle>
+            <a:defPPr>
+              <a:defRPr lang="en-US"/>
+            </a:defPPr>
+            <a:lvl1pPr marL="0" algn="l" defTabSz="914400" rtl="0" eaLnBrk="1" latinLnBrk="0" hangingPunct="1">
+              <a:defRPr sz="1800" kern="1200">
+                <a:solidFill>
+                  <a:schemeClr val="dk1"/>
+                </a:solidFill>
+                <a:latin typeface="+mn-lt"/>
+                <a:ea typeface="+mn-ea"/>
+                <a:cs typeface="+mn-cs"/>
+              </a:defRPr>
+            </a:lvl1pPr>
+            <a:lvl2pPr marL="457200" algn="l" defTabSz="914400" rtl="0" eaLnBrk="1" latinLnBrk="0" hangingPunct="1">
+              <a:defRPr sz="1800" kern="1200">
+                <a:solidFill>
+                  <a:schemeClr val="dk1"/>
+                </a:solidFill>
+                <a:latin typeface="+mn-lt"/>
+                <a:ea typeface="+mn-ea"/>
+                <a:cs typeface="+mn-cs"/>
+              </a:defRPr>
+            </a:lvl2pPr>
+            <a:lvl3pPr marL="914400" algn="l" defTabSz="914400" rtl="0" eaLnBrk="1" latinLnBrk="0" hangingPunct="1">
+              <a:defRPr sz="1800" kern="1200">
+                <a:solidFill>
+                  <a:schemeClr val="dk1"/>
+                </a:solidFill>
+                <a:latin typeface="+mn-lt"/>
+                <a:ea typeface="+mn-ea"/>
+                <a:cs typeface="+mn-cs"/>
+              </a:defRPr>
+            </a:lvl3pPr>
+            <a:lvl4pPr marL="1371600" algn="l" defTabSz="914400" rtl="0" eaLnBrk="1" latinLnBrk="0" hangingPunct="1">
+              <a:defRPr sz="1800" kern="1200">
+                <a:solidFill>
+                  <a:schemeClr val="dk1"/>
+                </a:solidFill>
+                <a:latin typeface="+mn-lt"/>
+                <a:ea typeface="+mn-ea"/>
+                <a:cs typeface="+mn-cs"/>
+              </a:defRPr>
+            </a:lvl4pPr>
+            <a:lvl5pPr marL="1828800" algn="l" defTabSz="914400" rtl="0" eaLnBrk="1" latinLnBrk="0" hangingPunct="1">
+              <a:defRPr sz="1800" kern="1200">
+                <a:solidFill>
+                  <a:schemeClr val="dk1"/>
+                </a:solidFill>
+                <a:latin typeface="+mn-lt"/>
+                <a:ea typeface="+mn-ea"/>
+                <a:cs typeface="+mn-cs"/>
+              </a:defRPr>
+            </a:lvl5pPr>
+            <a:lvl6pPr marL="2286000" algn="l" defTabSz="914400" rtl="0" eaLnBrk="1" latinLnBrk="0" hangingPunct="1">
+              <a:defRPr sz="1800" kern="1200">
+                <a:solidFill>
+                  <a:schemeClr val="dk1"/>
+                </a:solidFill>
+                <a:latin typeface="+mn-lt"/>
+                <a:ea typeface="+mn-ea"/>
+                <a:cs typeface="+mn-cs"/>
+              </a:defRPr>
+            </a:lvl6pPr>
+            <a:lvl7pPr marL="2743200" algn="l" defTabSz="914400" rtl="0" eaLnBrk="1" latinLnBrk="0" hangingPunct="1">
+              <a:defRPr sz="1800" kern="1200">
+                <a:solidFill>
+                  <a:schemeClr val="dk1"/>
+                </a:solidFill>
+                <a:latin typeface="+mn-lt"/>
+                <a:ea typeface="+mn-ea"/>
+                <a:cs typeface="+mn-cs"/>
+              </a:defRPr>
+            </a:lvl7pPr>
+            <a:lvl8pPr marL="3200400" algn="l" defTabSz="914400" rtl="0" eaLnBrk="1" latinLnBrk="0" hangingPunct="1">
+              <a:defRPr sz="1800" kern="1200">
+                <a:solidFill>
+                  <a:schemeClr val="dk1"/>
+                </a:solidFill>
+                <a:latin typeface="+mn-lt"/>
+                <a:ea typeface="+mn-ea"/>
+                <a:cs typeface="+mn-cs"/>
+              </a:defRPr>
+            </a:lvl8pPr>
+            <a:lvl9pPr marL="3657600" algn="l" defTabSz="914400" rtl="0" eaLnBrk="1" latinLnBrk="0" hangingPunct="1">
+              <a:defRPr sz="1800" kern="1200">
+                <a:solidFill>
+                  <a:schemeClr val="dk1"/>
+                </a:solidFill>
+                <a:latin typeface="+mn-lt"/>
+                <a:ea typeface="+mn-ea"/>
+                <a:cs typeface="+mn-cs"/>
+              </a:defRPr>
+            </a:lvl9pPr>
+          </a:lstStyle>
+          <a:p>
+            <a:pPr algn="ctr"/>
+            <a:endParaRPr lang="en-SG" sz="1400">
+              <a:solidFill>
+                <a:schemeClr val="bg1"/>
+              </a:solidFill>
+            </a:endParaRPr>
+          </a:p>
+        </p:txBody>
+      </p:sp>
+      <p:cxnSp>
+        <p:nvCxnSpPr>
+          <p:cNvPr id="124" name="Straight Arrow Connector 123">
+            <a:extLst>
+              <a:ext uri="{FF2B5EF4-FFF2-40B4-BE49-F238E27FC236}">
+                <a16:creationId xmlns:a16="http://schemas.microsoft.com/office/drawing/2014/main" id="{D97115F8-81FA-4C8C-A8FA-1F92B6442D39}"/>
+              </a:ext>
+            </a:extLst>
+          </p:cNvPr>
+          <p:cNvCxnSpPr>
+            <a:cxnSpLocks/>
+          </p:cNvCxnSpPr>
+          <p:nvPr/>
+        </p:nvCxnSpPr>
+        <p:spPr>
+          <a:xfrm flipH="1">
+            <a:off x="2202795" y="3663547"/>
+            <a:ext cx="9141139" cy="0"/>
+          </a:xfrm>
+          <a:prstGeom prst="straightConnector1">
+            <a:avLst/>
+          </a:prstGeom>
+          <a:ln w="19050">
+            <a:solidFill>
+              <a:schemeClr val="tx1"/>
+            </a:solidFill>
+            <a:prstDash val="dash"/>
+            <a:tailEnd type="arrow"/>
+          </a:ln>
+        </p:spPr>
+        <p:style>
+          <a:lnRef idx="1">
+            <a:schemeClr val="accent1"/>
+          </a:lnRef>
+          <a:fillRef idx="0">
+            <a:schemeClr val="accent1"/>
+          </a:fillRef>
+          <a:effectRef idx="0">
+            <a:schemeClr val="accent1"/>
+          </a:effectRef>
+          <a:fontRef idx="minor">
+            <a:schemeClr val="tx1"/>
+          </a:fontRef>
+        </p:style>
+      </p:cxnSp>
+      <p:sp>
+        <p:nvSpPr>
+          <p:cNvPr id="140" name="TextBox 139">
+            <a:extLst>
+              <a:ext uri="{FF2B5EF4-FFF2-40B4-BE49-F238E27FC236}">
+                <a16:creationId xmlns:a16="http://schemas.microsoft.com/office/drawing/2014/main" id="{EE6339B2-8D4F-4427-916A-8E008939AEB4}"/>
+              </a:ext>
+            </a:extLst>
+          </p:cNvPr>
+          <p:cNvSpPr txBox="1"/>
+          <p:nvPr/>
+        </p:nvSpPr>
+        <p:spPr>
+          <a:xfrm>
+            <a:off x="9701191" y="3447417"/>
+            <a:ext cx="2210035" cy="230832"/>
+          </a:xfrm>
+          <a:prstGeom prst="rect">
+            <a:avLst/>
+          </a:prstGeom>
+          <a:noFill/>
+        </p:spPr>
+        <p:txBody>
+          <a:bodyPr wrap="square" rtlCol="0">
+            <a:spAutoFit/>
+          </a:bodyPr>
+          <a:lstStyle/>
+          <a:p>
+            <a:r>
+              <a:rPr lang="en-SG" sz="900" dirty="0"/>
+              <a:t>copyOfInternalAppointmentList</a:t>
+            </a:r>
+          </a:p>
+        </p:txBody>
+      </p:sp>
+      <p:cxnSp>
+        <p:nvCxnSpPr>
+          <p:cNvPr id="151" name="Straight Arrow Connector 150">
+            <a:extLst>
+              <a:ext uri="{FF2B5EF4-FFF2-40B4-BE49-F238E27FC236}">
+                <a16:creationId xmlns:a16="http://schemas.microsoft.com/office/drawing/2014/main" id="{4A210030-2277-4EA1-93D3-EFCE4184DB80}"/>
+              </a:ext>
+            </a:extLst>
+          </p:cNvPr>
+          <p:cNvCxnSpPr>
+            <a:cxnSpLocks/>
+          </p:cNvCxnSpPr>
+          <p:nvPr/>
+        </p:nvCxnSpPr>
+        <p:spPr>
+          <a:xfrm>
+            <a:off x="2300900" y="4368731"/>
+            <a:ext cx="1877296" cy="0"/>
+          </a:xfrm>
+          <a:prstGeom prst="straightConnector1">
+            <a:avLst/>
+          </a:prstGeom>
+          <a:ln w="19050">
+            <a:solidFill>
+              <a:schemeClr val="tx1"/>
+            </a:solidFill>
+            <a:tailEnd type="arrow"/>
+          </a:ln>
+        </p:spPr>
+        <p:style>
+          <a:lnRef idx="1">
+            <a:schemeClr val="accent1"/>
+          </a:lnRef>
+          <a:fillRef idx="0">
+            <a:schemeClr val="accent1"/>
+          </a:fillRef>
+          <a:effectRef idx="0">
+            <a:schemeClr val="accent1"/>
+          </a:effectRef>
+          <a:fontRef idx="minor">
+            <a:schemeClr val="tx1"/>
+          </a:fontRef>
+        </p:style>
+      </p:cxnSp>
+      <p:sp>
+        <p:nvSpPr>
+          <p:cNvPr id="152" name="TextBox 151">
+            <a:extLst>
+              <a:ext uri="{FF2B5EF4-FFF2-40B4-BE49-F238E27FC236}">
+                <a16:creationId xmlns:a16="http://schemas.microsoft.com/office/drawing/2014/main" id="{3AD92526-2A1E-4759-873D-F26B31F9BED8}"/>
+              </a:ext>
+            </a:extLst>
+          </p:cNvPr>
+          <p:cNvSpPr txBox="1"/>
+          <p:nvPr/>
+        </p:nvSpPr>
+        <p:spPr>
+          <a:xfrm>
+            <a:off x="2240008" y="3895037"/>
+            <a:ext cx="2210035" cy="461665"/>
+          </a:xfrm>
+          <a:prstGeom prst="rect">
+            <a:avLst/>
+          </a:prstGeom>
+          <a:noFill/>
+        </p:spPr>
+        <p:txBody>
+          <a:bodyPr wrap="square" rtlCol="0">
+            <a:spAutoFit/>
+          </a:bodyPr>
+          <a:lstStyle/>
+          <a:p>
+            <a:r>
+              <a:rPr lang="en-SG" sz="1200" dirty="0"/>
+              <a:t>setAppointment(copyOfInternalAppointmentList)</a:t>
+            </a:r>
+          </a:p>
+        </p:txBody>
+      </p:sp>
+      <p:sp>
+        <p:nvSpPr>
+          <p:cNvPr id="153" name="Rectangle 152">
+            <a:extLst>
+              <a:ext uri="{FF2B5EF4-FFF2-40B4-BE49-F238E27FC236}">
+                <a16:creationId xmlns:a16="http://schemas.microsoft.com/office/drawing/2014/main" id="{1BDF51FA-681B-4190-A5BE-BD33EAB61127}"/>
+              </a:ext>
+            </a:extLst>
+          </p:cNvPr>
+          <p:cNvSpPr/>
+          <p:nvPr/>
+        </p:nvSpPr>
+        <p:spPr>
+          <a:xfrm>
+            <a:off x="4283731" y="4320167"/>
+            <a:ext cx="125589" cy="1391882"/>
+          </a:xfrm>
+          <a:prstGeom prst="rect">
+            <a:avLst/>
+          </a:prstGeom>
+          <a:solidFill>
+            <a:srgbClr val="F8CECC"/>
+          </a:solidFill>
+          <a:ln>
+            <a:solidFill>
+              <a:schemeClr val="tx1"/>
+            </a:solidFill>
+          </a:ln>
+          <a:effectLst/>
+        </p:spPr>
+        <p:style>
+          <a:lnRef idx="1">
+            <a:schemeClr val="accent3"/>
+          </a:lnRef>
+          <a:fillRef idx="2">
+            <a:schemeClr val="accent3"/>
+          </a:fillRef>
+          <a:effectRef idx="1">
+            <a:schemeClr val="accent3"/>
+          </a:effectRef>
+          <a:fontRef idx="minor">
+            <a:schemeClr val="dk1"/>
+          </a:fontRef>
+        </p:style>
+        <p:txBody>
+          <a:bodyPr rtlCol="0" anchor="ctr"/>
+          <a:lstStyle>
+            <a:defPPr>
+              <a:defRPr lang="en-US"/>
+            </a:defPPr>
+            <a:lvl1pPr marL="0" algn="l" defTabSz="914400" rtl="0" eaLnBrk="1" latinLnBrk="0" hangingPunct="1">
+              <a:defRPr sz="1800" kern="1200">
+                <a:solidFill>
+                  <a:schemeClr val="dk1"/>
+                </a:solidFill>
+                <a:latin typeface="+mn-lt"/>
+                <a:ea typeface="+mn-ea"/>
+                <a:cs typeface="+mn-cs"/>
+              </a:defRPr>
+            </a:lvl1pPr>
+            <a:lvl2pPr marL="457200" algn="l" defTabSz="914400" rtl="0" eaLnBrk="1" latinLnBrk="0" hangingPunct="1">
+              <a:defRPr sz="1800" kern="1200">
+                <a:solidFill>
+                  <a:schemeClr val="dk1"/>
+                </a:solidFill>
+                <a:latin typeface="+mn-lt"/>
+                <a:ea typeface="+mn-ea"/>
+                <a:cs typeface="+mn-cs"/>
+              </a:defRPr>
+            </a:lvl2pPr>
+            <a:lvl3pPr marL="914400" algn="l" defTabSz="914400" rtl="0" eaLnBrk="1" latinLnBrk="0" hangingPunct="1">
+              <a:defRPr sz="1800" kern="1200">
+                <a:solidFill>
+                  <a:schemeClr val="dk1"/>
+                </a:solidFill>
+                <a:latin typeface="+mn-lt"/>
+                <a:ea typeface="+mn-ea"/>
+                <a:cs typeface="+mn-cs"/>
+              </a:defRPr>
+            </a:lvl3pPr>
+            <a:lvl4pPr marL="1371600" algn="l" defTabSz="914400" rtl="0" eaLnBrk="1" latinLnBrk="0" hangingPunct="1">
+              <a:defRPr sz="1800" kern="1200">
+                <a:solidFill>
+                  <a:schemeClr val="dk1"/>
+                </a:solidFill>
+                <a:latin typeface="+mn-lt"/>
+                <a:ea typeface="+mn-ea"/>
+                <a:cs typeface="+mn-cs"/>
+              </a:defRPr>
+            </a:lvl4pPr>
+            <a:lvl5pPr marL="1828800" algn="l" defTabSz="914400" rtl="0" eaLnBrk="1" latinLnBrk="0" hangingPunct="1">
+              <a:defRPr sz="1800" kern="1200">
+                <a:solidFill>
+                  <a:schemeClr val="dk1"/>
+                </a:solidFill>
+                <a:latin typeface="+mn-lt"/>
+                <a:ea typeface="+mn-ea"/>
+                <a:cs typeface="+mn-cs"/>
+              </a:defRPr>
+            </a:lvl5pPr>
+            <a:lvl6pPr marL="2286000" algn="l" defTabSz="914400" rtl="0" eaLnBrk="1" latinLnBrk="0" hangingPunct="1">
+              <a:defRPr sz="1800" kern="1200">
+                <a:solidFill>
+                  <a:schemeClr val="dk1"/>
+                </a:solidFill>
+                <a:latin typeface="+mn-lt"/>
+                <a:ea typeface="+mn-ea"/>
+                <a:cs typeface="+mn-cs"/>
+              </a:defRPr>
+            </a:lvl6pPr>
+            <a:lvl7pPr marL="2743200" algn="l" defTabSz="914400" rtl="0" eaLnBrk="1" latinLnBrk="0" hangingPunct="1">
+              <a:defRPr sz="1800" kern="1200">
+                <a:solidFill>
+                  <a:schemeClr val="dk1"/>
+                </a:solidFill>
+                <a:latin typeface="+mn-lt"/>
+                <a:ea typeface="+mn-ea"/>
+                <a:cs typeface="+mn-cs"/>
+              </a:defRPr>
+            </a:lvl7pPr>
+            <a:lvl8pPr marL="3200400" algn="l" defTabSz="914400" rtl="0" eaLnBrk="1" latinLnBrk="0" hangingPunct="1">
+              <a:defRPr sz="1800" kern="1200">
+                <a:solidFill>
+                  <a:schemeClr val="dk1"/>
+                </a:solidFill>
+                <a:latin typeface="+mn-lt"/>
+                <a:ea typeface="+mn-ea"/>
+                <a:cs typeface="+mn-cs"/>
+              </a:defRPr>
+            </a:lvl8pPr>
+            <a:lvl9pPr marL="3657600" algn="l" defTabSz="914400" rtl="0" eaLnBrk="1" latinLnBrk="0" hangingPunct="1">
+              <a:defRPr sz="1800" kern="1200">
+                <a:solidFill>
+                  <a:schemeClr val="dk1"/>
+                </a:solidFill>
+                <a:latin typeface="+mn-lt"/>
+                <a:ea typeface="+mn-ea"/>
+                <a:cs typeface="+mn-cs"/>
+              </a:defRPr>
+            </a:lvl9pPr>
+          </a:lstStyle>
+          <a:p>
+            <a:pPr algn="ctr"/>
+            <a:endParaRPr lang="en-SG" sz="1400">
+              <a:solidFill>
+                <a:schemeClr val="bg1"/>
+              </a:solidFill>
+            </a:endParaRPr>
+          </a:p>
+        </p:txBody>
+      </p:sp>
+      <p:cxnSp>
+        <p:nvCxnSpPr>
+          <p:cNvPr id="154" name="Straight Arrow Connector 153">
+            <a:extLst>
+              <a:ext uri="{FF2B5EF4-FFF2-40B4-BE49-F238E27FC236}">
+                <a16:creationId xmlns:a16="http://schemas.microsoft.com/office/drawing/2014/main" id="{D1301B2D-1CE3-4D93-BA8F-DAE662BC4F6A}"/>
+              </a:ext>
+            </a:extLst>
+          </p:cNvPr>
+          <p:cNvCxnSpPr>
+            <a:cxnSpLocks/>
+          </p:cNvCxnSpPr>
+          <p:nvPr/>
+        </p:nvCxnSpPr>
+        <p:spPr>
+          <a:xfrm flipV="1">
+            <a:off x="4460138" y="4509101"/>
+            <a:ext cx="2015862" cy="6893"/>
+          </a:xfrm>
+          <a:prstGeom prst="straightConnector1">
+            <a:avLst/>
+          </a:prstGeom>
+          <a:ln w="19050">
+            <a:solidFill>
+              <a:schemeClr val="tx1"/>
+            </a:solidFill>
+            <a:tailEnd type="arrow"/>
+          </a:ln>
+        </p:spPr>
+        <p:style>
+          <a:lnRef idx="1">
+            <a:schemeClr val="accent1"/>
+          </a:lnRef>
+          <a:fillRef idx="0">
+            <a:schemeClr val="accent1"/>
+          </a:fillRef>
+          <a:effectRef idx="0">
+            <a:schemeClr val="accent1"/>
+          </a:effectRef>
+          <a:fontRef idx="minor">
+            <a:schemeClr val="tx1"/>
+          </a:fontRef>
+        </p:style>
+      </p:cxnSp>
+      <p:sp>
+        <p:nvSpPr>
+          <p:cNvPr id="156" name="Rectangle: Rounded Corners 155">
+            <a:extLst>
+              <a:ext uri="{FF2B5EF4-FFF2-40B4-BE49-F238E27FC236}">
+                <a16:creationId xmlns:a16="http://schemas.microsoft.com/office/drawing/2014/main" id="{77AD0D9D-03FE-4879-90CB-BEB8200E9A78}"/>
+              </a:ext>
+            </a:extLst>
+          </p:cNvPr>
+          <p:cNvSpPr/>
+          <p:nvPr/>
+        </p:nvSpPr>
+        <p:spPr>
+          <a:xfrm>
+            <a:off x="6543424" y="4197191"/>
+            <a:ext cx="1514074" cy="461666"/>
+          </a:xfrm>
+          <a:prstGeom prst="roundRect">
+            <a:avLst/>
+          </a:prstGeom>
+          <a:solidFill>
+            <a:srgbClr val="F8CECC"/>
+          </a:solidFill>
+        </p:spPr>
+        <p:style>
+          <a:lnRef idx="2">
+            <a:schemeClr val="accent1">
+              <a:shade val="50000"/>
+            </a:schemeClr>
+          </a:lnRef>
+          <a:fillRef idx="1">
+            <a:schemeClr val="accent1"/>
+          </a:fillRef>
+          <a:effectRef idx="0">
+            <a:schemeClr val="accent1"/>
+          </a:effectRef>
+          <a:fontRef idx="minor">
+            <a:schemeClr val="lt1"/>
+          </a:fontRef>
+        </p:style>
+        <p:txBody>
+          <a:bodyPr rtlCol="0" anchor="ctr"/>
+          <a:lstStyle/>
+          <a:p>
+            <a:pPr algn="ctr"/>
+            <a:r>
+              <a:rPr lang="en-SG" sz="1400" dirty="0">
+                <a:solidFill>
+                  <a:schemeClr val="tx1"/>
+                </a:solidFill>
+              </a:rPr>
+              <a:t>AppointmentList</a:t>
+            </a:r>
+          </a:p>
+        </p:txBody>
+      </p:sp>
+      <p:sp>
+        <p:nvSpPr>
+          <p:cNvPr id="161" name="TextBox 160">
+            <a:extLst>
+              <a:ext uri="{FF2B5EF4-FFF2-40B4-BE49-F238E27FC236}">
+                <a16:creationId xmlns:a16="http://schemas.microsoft.com/office/drawing/2014/main" id="{E20B5BB8-209F-4D6B-9993-A8E208483A30}"/>
+              </a:ext>
+            </a:extLst>
+          </p:cNvPr>
+          <p:cNvSpPr txBox="1"/>
+          <p:nvPr/>
+        </p:nvSpPr>
+        <p:spPr>
+          <a:xfrm>
+            <a:off x="4443272" y="4054329"/>
+            <a:ext cx="2210035" cy="461665"/>
+          </a:xfrm>
+          <a:prstGeom prst="rect">
+            <a:avLst/>
+          </a:prstGeom>
+          <a:noFill/>
+        </p:spPr>
+        <p:txBody>
+          <a:bodyPr wrap="square" rtlCol="0">
+            <a:spAutoFit/>
+          </a:bodyPr>
+          <a:lstStyle/>
+          <a:p>
+            <a:r>
+              <a:rPr lang="en-SG" sz="1200" dirty="0"/>
+              <a:t>List&lt;Appointment&gt;(copyOf</a:t>
+            </a:r>
+          </a:p>
+          <a:p>
+            <a:r>
+              <a:rPr lang="en-SG" sz="1200" dirty="0"/>
+              <a:t>InteralAppointmentList)</a:t>
+            </a:r>
+          </a:p>
+        </p:txBody>
+      </p:sp>
+      <p:cxnSp>
+        <p:nvCxnSpPr>
+          <p:cNvPr id="164" name="Straight Arrow Connector 163">
+            <a:extLst>
+              <a:ext uri="{FF2B5EF4-FFF2-40B4-BE49-F238E27FC236}">
+                <a16:creationId xmlns:a16="http://schemas.microsoft.com/office/drawing/2014/main" id="{7B5CC55F-7736-4287-869E-8254A1A99FF4}"/>
+              </a:ext>
+            </a:extLst>
+          </p:cNvPr>
+          <p:cNvCxnSpPr>
+            <a:cxnSpLocks/>
+          </p:cNvCxnSpPr>
+          <p:nvPr/>
+        </p:nvCxnSpPr>
+        <p:spPr>
+          <a:xfrm flipH="1">
+            <a:off x="4460139" y="4886708"/>
+            <a:ext cx="2639304" cy="0"/>
+          </a:xfrm>
+          <a:prstGeom prst="straightConnector1">
+            <a:avLst/>
+          </a:prstGeom>
+          <a:ln w="19050">
+            <a:solidFill>
+              <a:schemeClr val="tx1"/>
+            </a:solidFill>
+            <a:prstDash val="dash"/>
+            <a:tailEnd type="arrow"/>
           </a:ln>
         </p:spPr>
         <p:style>
@@ -5785,40 +5800,34 @@
       </p:cxnSp>
       <p:cxnSp>
         <p:nvCxnSpPr>
-          <p:cNvPr id="45" name="Straight Arrow Connector 44">
-            <a:extLst>
-              <a:ext uri="{FF2B5EF4-FFF2-40B4-BE49-F238E27FC236}">
-                <a16:creationId xmlns:a16="http://schemas.microsoft.com/office/drawing/2014/main" id="{41CF7E6C-EF55-475F-8954-586D9B8B8C39}"/>
-              </a:ext>
-            </a:extLst>
-          </p:cNvPr>
-          <p:cNvCxnSpPr>
-            <a:cxnSpLocks/>
-          </p:cNvCxnSpPr>
+          <p:cNvPr id="169" name="Straight Connector 168">
+            <a:extLst>
+              <a:ext uri="{FF2B5EF4-FFF2-40B4-BE49-F238E27FC236}">
+                <a16:creationId xmlns:a16="http://schemas.microsoft.com/office/drawing/2014/main" id="{CB2EF037-6AFF-4259-96B0-A059B9AFA988}"/>
+              </a:ext>
+            </a:extLst>
+          </p:cNvPr>
+          <p:cNvCxnSpPr/>
           <p:nvPr/>
         </p:nvCxnSpPr>
         <p:spPr>
-          <a:xfrm flipH="1">
-            <a:off x="623598" y="6236413"/>
-            <a:ext cx="1329240" cy="0"/>
-          </a:xfrm>
-          <a:prstGeom prst="straightConnector1">
+          <a:xfrm>
+            <a:off x="4443272" y="5183313"/>
+            <a:ext cx="341174" cy="0"/>
+          </a:xfrm>
+          <a:prstGeom prst="line">
             <a:avLst/>
           </a:prstGeom>
-          <a:ln w="19050">
-            <a:prstDash val="sysDash"/>
-            <a:tailEnd type="triangle"/>
-          </a:ln>
         </p:spPr>
         <p:style>
-          <a:lnRef idx="1">
-            <a:schemeClr val="accent1"/>
+          <a:lnRef idx="3">
+            <a:schemeClr val="dk1"/>
           </a:lnRef>
           <a:fillRef idx="0">
-            <a:schemeClr val="accent1"/>
+            <a:schemeClr val="dk1"/>
           </a:fillRef>
-          <a:effectRef idx="0">
-            <a:schemeClr val="accent1"/>
+          <a:effectRef idx="2">
+            <a:schemeClr val="dk1"/>
           </a:effectRef>
           <a:fontRef idx="minor">
             <a:schemeClr val="tx1"/>
@@ -5827,10 +5836,10 @@
       </p:cxnSp>
       <p:cxnSp>
         <p:nvCxnSpPr>
-          <p:cNvPr id="47" name="Straight Arrow Connector 46">
-            <a:extLst>
-              <a:ext uri="{FF2B5EF4-FFF2-40B4-BE49-F238E27FC236}">
-                <a16:creationId xmlns:a16="http://schemas.microsoft.com/office/drawing/2014/main" id="{F7E7A304-7D89-472F-B7C6-B88448DE8B20}"/>
+          <p:cNvPr id="171" name="Straight Connector 170">
+            <a:extLst>
+              <a:ext uri="{FF2B5EF4-FFF2-40B4-BE49-F238E27FC236}">
+                <a16:creationId xmlns:a16="http://schemas.microsoft.com/office/drawing/2014/main" id="{69D67049-AD06-4FBE-BFC1-D379E96E58DE}"/>
               </a:ext>
             </a:extLst>
           </p:cNvPr>
@@ -5840,9 +5849,47 @@
           <p:nvPr/>
         </p:nvCxnSpPr>
         <p:spPr>
+          <a:xfrm>
+            <a:off x="4784446" y="5183313"/>
+            <a:ext cx="0" cy="226031"/>
+          </a:xfrm>
+          <a:prstGeom prst="line">
+            <a:avLst/>
+          </a:prstGeom>
+        </p:spPr>
+        <p:style>
+          <a:lnRef idx="3">
+            <a:schemeClr val="dk1"/>
+          </a:lnRef>
+          <a:fillRef idx="0">
+            <a:schemeClr val="dk1"/>
+          </a:fillRef>
+          <a:effectRef idx="2">
+            <a:schemeClr val="dk1"/>
+          </a:effectRef>
+          <a:fontRef idx="minor">
+            <a:schemeClr val="tx1"/>
+          </a:fontRef>
+        </p:style>
+      </p:cxnSp>
+      <p:cxnSp>
+        <p:nvCxnSpPr>
+          <p:cNvPr id="174" name="Straight Arrow Connector 173">
+            <a:extLst>
+              <a:ext uri="{FF2B5EF4-FFF2-40B4-BE49-F238E27FC236}">
+                <a16:creationId xmlns:a16="http://schemas.microsoft.com/office/drawing/2014/main" id="{1A005242-5005-43EE-B33A-46E34C3059A5}"/>
+              </a:ext>
+            </a:extLst>
+          </p:cNvPr>
+          <p:cNvCxnSpPr>
+            <a:cxnSpLocks/>
+          </p:cNvCxnSpPr>
+          <p:nvPr/>
+        </p:nvCxnSpPr>
+        <p:spPr>
           <a:xfrm flipH="1">
-            <a:off x="5613628" y="5255467"/>
-            <a:ext cx="3635534" cy="0"/>
+            <a:off x="4443272" y="5409344"/>
+            <a:ext cx="338332" cy="0"/>
           </a:xfrm>
           <a:prstGeom prst="straightConnector1">
             <a:avLst/>
@@ -5851,6 +5898,242 @@
             <a:solidFill>
               <a:schemeClr val="tx1"/>
             </a:solidFill>
+            <a:tailEnd type="arrow"/>
+          </a:ln>
+        </p:spPr>
+        <p:style>
+          <a:lnRef idx="1">
+            <a:schemeClr val="accent1"/>
+          </a:lnRef>
+          <a:fillRef idx="0">
+            <a:schemeClr val="accent1"/>
+          </a:fillRef>
+          <a:effectRef idx="0">
+            <a:schemeClr val="accent1"/>
+          </a:effectRef>
+          <a:fontRef idx="minor">
+            <a:schemeClr val="tx1"/>
+          </a:fontRef>
+        </p:style>
+      </p:cxnSp>
+      <p:sp>
+        <p:nvSpPr>
+          <p:cNvPr id="176" name="TextBox 175">
+            <a:extLst>
+              <a:ext uri="{FF2B5EF4-FFF2-40B4-BE49-F238E27FC236}">
+                <a16:creationId xmlns:a16="http://schemas.microsoft.com/office/drawing/2014/main" id="{D563C16C-CC6D-4377-A20D-A9FA3E32670F}"/>
+              </a:ext>
+            </a:extLst>
+          </p:cNvPr>
+          <p:cNvSpPr txBox="1"/>
+          <p:nvPr/>
+        </p:nvSpPr>
+        <p:spPr>
+          <a:xfrm>
+            <a:off x="4889408" y="4609709"/>
+            <a:ext cx="2210035" cy="276999"/>
+          </a:xfrm>
+          <a:prstGeom prst="rect">
+            <a:avLst/>
+          </a:prstGeom>
+          <a:noFill/>
+        </p:spPr>
+        <p:txBody>
+          <a:bodyPr wrap="square" rtlCol="0">
+            <a:spAutoFit/>
+          </a:bodyPr>
+          <a:lstStyle/>
+          <a:p>
+            <a:r>
+              <a:rPr lang="en-SG" sz="1200" dirty="0"/>
+              <a:t>newAppointmentList</a:t>
+            </a:r>
+          </a:p>
+        </p:txBody>
+      </p:sp>
+      <p:sp>
+        <p:nvSpPr>
+          <p:cNvPr id="177" name="TextBox 176">
+            <a:extLst>
+              <a:ext uri="{FF2B5EF4-FFF2-40B4-BE49-F238E27FC236}">
+                <a16:creationId xmlns:a16="http://schemas.microsoft.com/office/drawing/2014/main" id="{299877F5-4604-44D2-9F0C-7523CCAAE743}"/>
+              </a:ext>
+            </a:extLst>
+          </p:cNvPr>
+          <p:cNvSpPr txBox="1"/>
+          <p:nvPr/>
+        </p:nvSpPr>
+        <p:spPr>
+          <a:xfrm>
+            <a:off x="4781604" y="5154103"/>
+            <a:ext cx="2210035" cy="276999"/>
+          </a:xfrm>
+          <a:prstGeom prst="rect">
+            <a:avLst/>
+          </a:prstGeom>
+          <a:noFill/>
+        </p:spPr>
+        <p:txBody>
+          <a:bodyPr wrap="square" rtlCol="0">
+            <a:spAutoFit/>
+          </a:bodyPr>
+          <a:lstStyle/>
+          <a:p>
+            <a:r>
+              <a:rPr lang="en-SG" sz="1200" dirty="0"/>
+              <a:t>set(newAppointmentList)</a:t>
+            </a:r>
+          </a:p>
+        </p:txBody>
+      </p:sp>
+      <p:cxnSp>
+        <p:nvCxnSpPr>
+          <p:cNvPr id="178" name="Straight Connector 177">
+            <a:extLst>
+              <a:ext uri="{FF2B5EF4-FFF2-40B4-BE49-F238E27FC236}">
+                <a16:creationId xmlns:a16="http://schemas.microsoft.com/office/drawing/2014/main" id="{C473A8D3-3060-4A6F-AF12-4F94539E17D2}"/>
+              </a:ext>
+            </a:extLst>
+          </p:cNvPr>
+          <p:cNvCxnSpPr>
+            <a:cxnSpLocks/>
+          </p:cNvCxnSpPr>
+          <p:nvPr/>
+        </p:nvCxnSpPr>
+        <p:spPr>
+          <a:xfrm>
+            <a:off x="8222975" y="5333430"/>
+            <a:ext cx="136561" cy="158040"/>
+          </a:xfrm>
+          <a:prstGeom prst="line">
+            <a:avLst/>
+          </a:prstGeom>
+        </p:spPr>
+        <p:style>
+          <a:lnRef idx="3">
+            <a:schemeClr val="dk1"/>
+          </a:lnRef>
+          <a:fillRef idx="0">
+            <a:schemeClr val="dk1"/>
+          </a:fillRef>
+          <a:effectRef idx="2">
+            <a:schemeClr val="dk1"/>
+          </a:effectRef>
+          <a:fontRef idx="minor">
+            <a:schemeClr val="tx1"/>
+          </a:fontRef>
+        </p:style>
+      </p:cxnSp>
+      <p:cxnSp>
+        <p:nvCxnSpPr>
+          <p:cNvPr id="180" name="Straight Connector 179">
+            <a:extLst>
+              <a:ext uri="{FF2B5EF4-FFF2-40B4-BE49-F238E27FC236}">
+                <a16:creationId xmlns:a16="http://schemas.microsoft.com/office/drawing/2014/main" id="{DE1416AB-FF9B-4F18-965D-C4B1F4AC51CF}"/>
+              </a:ext>
+            </a:extLst>
+          </p:cNvPr>
+          <p:cNvCxnSpPr>
+            <a:cxnSpLocks/>
+          </p:cNvCxnSpPr>
+          <p:nvPr/>
+        </p:nvCxnSpPr>
+        <p:spPr>
+          <a:xfrm flipH="1">
+            <a:off x="8231636" y="5333430"/>
+            <a:ext cx="127900" cy="158040"/>
+          </a:xfrm>
+          <a:prstGeom prst="line">
+            <a:avLst/>
+          </a:prstGeom>
+        </p:spPr>
+        <p:style>
+          <a:lnRef idx="3">
+            <a:schemeClr val="dk1"/>
+          </a:lnRef>
+          <a:fillRef idx="0">
+            <a:schemeClr val="dk1"/>
+          </a:fillRef>
+          <a:effectRef idx="2">
+            <a:schemeClr val="dk1"/>
+          </a:effectRef>
+          <a:fontRef idx="minor">
+            <a:schemeClr val="tx1"/>
+          </a:fontRef>
+        </p:style>
+      </p:cxnSp>
+      <p:cxnSp>
+        <p:nvCxnSpPr>
+          <p:cNvPr id="184" name="Straight Arrow Connector 183">
+            <a:extLst>
+              <a:ext uri="{FF2B5EF4-FFF2-40B4-BE49-F238E27FC236}">
+                <a16:creationId xmlns:a16="http://schemas.microsoft.com/office/drawing/2014/main" id="{5933F876-579F-48F8-84C2-7902CF91E473}"/>
+              </a:ext>
+            </a:extLst>
+          </p:cNvPr>
+          <p:cNvCxnSpPr>
+            <a:cxnSpLocks/>
+          </p:cNvCxnSpPr>
+          <p:nvPr/>
+        </p:nvCxnSpPr>
+        <p:spPr>
+          <a:xfrm flipH="1">
+            <a:off x="2197780" y="5721012"/>
+            <a:ext cx="2002109" cy="6541"/>
+          </a:xfrm>
+          <a:prstGeom prst="straightConnector1">
+            <a:avLst/>
+          </a:prstGeom>
+          <a:ln w="19050">
+            <a:solidFill>
+              <a:schemeClr val="tx1"/>
+            </a:solidFill>
+            <a:prstDash val="dash"/>
+            <a:tailEnd type="arrow"/>
+          </a:ln>
+        </p:spPr>
+        <p:style>
+          <a:lnRef idx="1">
+            <a:schemeClr val="accent1"/>
+          </a:lnRef>
+          <a:fillRef idx="0">
+            <a:schemeClr val="accent1"/>
+          </a:fillRef>
+          <a:effectRef idx="0">
+            <a:schemeClr val="accent1"/>
+          </a:effectRef>
+          <a:fontRef idx="minor">
+            <a:schemeClr val="tx1"/>
+          </a:fontRef>
+        </p:style>
+      </p:cxnSp>
+      <p:cxnSp>
+        <p:nvCxnSpPr>
+          <p:cNvPr id="185" name="Straight Arrow Connector 184">
+            <a:extLst>
+              <a:ext uri="{FF2B5EF4-FFF2-40B4-BE49-F238E27FC236}">
+                <a16:creationId xmlns:a16="http://schemas.microsoft.com/office/drawing/2014/main" id="{5EB31081-1E7D-4266-B8C0-A3DB30B94219}"/>
+              </a:ext>
+            </a:extLst>
+          </p:cNvPr>
+          <p:cNvCxnSpPr>
+            <a:cxnSpLocks/>
+          </p:cNvCxnSpPr>
+          <p:nvPr/>
+        </p:nvCxnSpPr>
+        <p:spPr>
+          <a:xfrm flipH="1">
+            <a:off x="143023" y="6001839"/>
+            <a:ext cx="1780099" cy="0"/>
+          </a:xfrm>
+          <a:prstGeom prst="straightConnector1">
+            <a:avLst/>
+          </a:prstGeom>
+          <a:ln w="19050">
+            <a:solidFill>
+              <a:schemeClr val="tx1"/>
+            </a:solidFill>
+            <a:prstDash val="dash"/>
             <a:tailEnd type="arrow"/>
           </a:ln>
         </p:spPr>

</xml_diff>